<commit_message>
fixing up Hong Kong changes into module05
</commit_message>
<xml_diff>
--- a/Slides/Lesson 1.1 The Function Design Recipe.pptx
+++ b/Slides/Lesson 1.1 The Function Design Recipe.pptx
@@ -44,20 +44,11 @@
   <p:notesSz cx="6858000" cy="9296400"/>
   <p:embeddedFontLst>
     <p:embeddedFont>
-      <p:font typeface="CMSY10ORIG" panose="020B0604020202020204"/>
+      <p:font typeface="Calibri" panose="020F0502020204030204" pitchFamily="34" charset="0"/>
       <p:regular r:id="rId32"/>
-    </p:embeddedFont>
-    <p:embeddedFont>
-      <p:font typeface="cmmi12" panose="020B0604020202020204"/>
-      <p:regular r:id="rId33"/>
-    </p:embeddedFont>
-    <p:embeddedFont>
-      <p:font typeface="CMMI10" panose="020B0604020202020204"/>
-      <p:regular r:id="rId34"/>
-    </p:embeddedFont>
-    <p:embeddedFont>
-      <p:font typeface="Cambria Math" panose="02040503050406030204" pitchFamily="18" charset="0"/>
-      <p:regular r:id="rId35"/>
+      <p:bold r:id="rId33"/>
+      <p:italic r:id="rId34"/>
+      <p:boldItalic r:id="rId35"/>
     </p:embeddedFont>
     <p:embeddedFont>
       <p:font typeface="Consolas" panose="020B0609020204030204" pitchFamily="49" charset="0"/>
@@ -67,18 +58,27 @@
       <p:boldItalic r:id="rId39"/>
     </p:embeddedFont>
     <p:embeddedFont>
-      <p:font typeface="Calibri" panose="020F0502020204030204" pitchFamily="34" charset="0"/>
+      <p:font typeface="CMMI10" panose="020B0604020202020204"/>
       <p:regular r:id="rId40"/>
-      <p:bold r:id="rId41"/>
-      <p:italic r:id="rId42"/>
-      <p:boldItalic r:id="rId43"/>
     </p:embeddedFont>
     <p:embeddedFont>
-      <p:font typeface="Arial Unicode MS" panose="020B0604020202020204" pitchFamily="34" charset="-128"/>
+      <p:font typeface="Cambria Math" panose="02040503050406030204" pitchFamily="18" charset="0"/>
+      <p:regular r:id="rId41"/>
+    </p:embeddedFont>
+    <p:embeddedFont>
+      <p:font typeface="Arial Unicode MS" panose="020B0604020202020204" charset="-128"/>
+      <p:regular r:id="rId42"/>
+    </p:embeddedFont>
+    <p:embeddedFont>
+      <p:font typeface="cmmi12" panose="020B0604020202020204"/>
+      <p:regular r:id="rId43"/>
+    </p:embeddedFont>
+    <p:embeddedFont>
+      <p:font typeface="CMR10" panose="020B0604020202020204"/>
       <p:regular r:id="rId44"/>
     </p:embeddedFont>
     <p:embeddedFont>
-      <p:font typeface="CMR10" panose="020B0604020202020204"/>
+      <p:font typeface="CMSY10ORIG" panose="020B0604020202020204"/>
       <p:regular r:id="rId45"/>
     </p:embeddedFont>
   </p:embeddedFontLst>
@@ -1518,6 +1518,42 @@
         </a:p>
       </dgm:t>
     </dgm:pt>
+    <dgm:pt modelId="{2F5428A6-4B7D-4C0E-9CAB-79528BD25A97}">
+      <dgm:prSet phldrT="[Text]"/>
+      <dgm:spPr/>
+      <dgm:t>
+        <a:bodyPr/>
+        <a:lstStyle/>
+        <a:p>
+          <a:r>
+            <a:rPr lang="en-US" dirty="0"/>
+            <a:t>Computing with Higher-Order Functions</a:t>
+          </a:r>
+        </a:p>
+      </dgm:t>
+    </dgm:pt>
+    <dgm:pt modelId="{5FEB1B6C-FFE0-497B-AC09-97C2A4F7BDF4}" type="parTrans" cxnId="{89929C80-2DC0-4D55-A509-D03B65DF1DA5}">
+      <dgm:prSet/>
+      <dgm:spPr/>
+      <dgm:t>
+        <a:bodyPr/>
+        <a:lstStyle/>
+        <a:p>
+          <a:endParaRPr lang="en-US"/>
+        </a:p>
+      </dgm:t>
+    </dgm:pt>
+    <dgm:pt modelId="{F7A995F7-0D98-4650-B482-7B23AA209241}" type="sibTrans" cxnId="{89929C80-2DC0-4D55-A509-D03B65DF1DA5}">
+      <dgm:prSet/>
+      <dgm:spPr/>
+      <dgm:t>
+        <a:bodyPr/>
+        <a:lstStyle/>
+        <a:p>
+          <a:endParaRPr lang="en-US"/>
+        </a:p>
+      </dgm:t>
+    </dgm:pt>
     <dgm:pt modelId="{5EAC0F1C-8135-499C-A050-8951C4D4D68B}" type="pres">
       <dgm:prSet presAssocID="{D4ADF4FB-6626-4BAA-8170-1AB86830E7EB}" presName="diagram" presStyleCnt="0">
         <dgm:presLayoutVars>
@@ -1551,11 +1587,11 @@
       <dgm:spPr/>
     </dgm:pt>
     <dgm:pt modelId="{360B229B-0F55-45E5-A55A-DDDBDBD1C921}" type="pres">
-      <dgm:prSet presAssocID="{9E647244-45B2-496C-B687-01576FEABEC4}" presName="Name13" presStyleLbl="parChTrans1D2" presStyleIdx="0" presStyleCnt="11"/>
+      <dgm:prSet presAssocID="{9E647244-45B2-496C-B687-01576FEABEC4}" presName="Name13" presStyleLbl="parChTrans1D2" presStyleIdx="0" presStyleCnt="12"/>
       <dgm:spPr/>
     </dgm:pt>
     <dgm:pt modelId="{7E3D7089-292B-46E8-B4F0-ADC3733C52BD}" type="pres">
-      <dgm:prSet presAssocID="{DDB8B436-9528-434E-BD0F-6EB4D2ACB929}" presName="childText" presStyleLbl="bgAcc1" presStyleIdx="0" presStyleCnt="11">
+      <dgm:prSet presAssocID="{DDB8B436-9528-434E-BD0F-6EB4D2ACB929}" presName="childText" presStyleLbl="bgAcc1" presStyleIdx="0" presStyleCnt="12">
         <dgm:presLayoutVars>
           <dgm:bulletEnabled val="1"/>
         </dgm:presLayoutVars>
@@ -1563,11 +1599,11 @@
       <dgm:spPr/>
     </dgm:pt>
     <dgm:pt modelId="{BC1B1EA4-129C-44F6-935B-BA646A7A2AA3}" type="pres">
-      <dgm:prSet presAssocID="{03056A9D-BCBF-4181-B8D6-7E4ECCBD4D9E}" presName="Name13" presStyleLbl="parChTrans1D2" presStyleIdx="1" presStyleCnt="11"/>
+      <dgm:prSet presAssocID="{03056A9D-BCBF-4181-B8D6-7E4ECCBD4D9E}" presName="Name13" presStyleLbl="parChTrans1D2" presStyleIdx="1" presStyleCnt="12"/>
       <dgm:spPr/>
     </dgm:pt>
     <dgm:pt modelId="{CF0B1CD2-0FC3-49A4-A520-B01A6C3CCB95}" type="pres">
-      <dgm:prSet presAssocID="{F221EA58-7488-4550-B7A5-965344CA7EAE}" presName="childText" presStyleLbl="bgAcc1" presStyleIdx="1" presStyleCnt="11">
+      <dgm:prSet presAssocID="{F221EA58-7488-4550-B7A5-965344CA7EAE}" presName="childText" presStyleLbl="bgAcc1" presStyleIdx="1" presStyleCnt="12">
         <dgm:presLayoutVars>
           <dgm:bulletEnabled val="1"/>
         </dgm:presLayoutVars>
@@ -1575,11 +1611,11 @@
       <dgm:spPr/>
     </dgm:pt>
     <dgm:pt modelId="{F5AE7053-0C33-481C-8BFB-D2DAFB4C4294}" type="pres">
-      <dgm:prSet presAssocID="{08AACE21-5FAD-4460-B120-67387C8F0F32}" presName="Name13" presStyleLbl="parChTrans1D2" presStyleIdx="2" presStyleCnt="11"/>
+      <dgm:prSet presAssocID="{08AACE21-5FAD-4460-B120-67387C8F0F32}" presName="Name13" presStyleLbl="parChTrans1D2" presStyleIdx="2" presStyleCnt="12"/>
       <dgm:spPr/>
     </dgm:pt>
     <dgm:pt modelId="{C5878689-67F2-4E3D-8C9B-392F50C32024}" type="pres">
-      <dgm:prSet presAssocID="{B1CEE35E-20B6-4A0B-B1E8-D4F40E3162E1}" presName="childText" presStyleLbl="bgAcc1" presStyleIdx="2" presStyleCnt="11">
+      <dgm:prSet presAssocID="{B1CEE35E-20B6-4A0B-B1E8-D4F40E3162E1}" presName="childText" presStyleLbl="bgAcc1" presStyleIdx="2" presStyleCnt="12">
         <dgm:presLayoutVars>
           <dgm:bulletEnabled val="1"/>
         </dgm:presLayoutVars>
@@ -1607,11 +1643,11 @@
       <dgm:spPr/>
     </dgm:pt>
     <dgm:pt modelId="{2564A6E5-875B-4BC6-B983-AA12C064A019}" type="pres">
-      <dgm:prSet presAssocID="{1EC30C20-D36E-4265-85EE-C210CE02F892}" presName="Name13" presStyleLbl="parChTrans1D2" presStyleIdx="3" presStyleCnt="11"/>
+      <dgm:prSet presAssocID="{1EC30C20-D36E-4265-85EE-C210CE02F892}" presName="Name13" presStyleLbl="parChTrans1D2" presStyleIdx="3" presStyleCnt="12"/>
       <dgm:spPr/>
     </dgm:pt>
     <dgm:pt modelId="{3B0CF9DF-CC55-47FF-BECE-903E70F9D2DE}" type="pres">
-      <dgm:prSet presAssocID="{1CBBDDB5-026A-42BF-8805-ACAC57AA5DC3}" presName="childText" presStyleLbl="bgAcc1" presStyleIdx="3" presStyleCnt="11">
+      <dgm:prSet presAssocID="{1CBBDDB5-026A-42BF-8805-ACAC57AA5DC3}" presName="childText" presStyleLbl="bgAcc1" presStyleIdx="3" presStyleCnt="12">
         <dgm:presLayoutVars>
           <dgm:bulletEnabled val="1"/>
         </dgm:presLayoutVars>
@@ -1619,11 +1655,11 @@
       <dgm:spPr/>
     </dgm:pt>
     <dgm:pt modelId="{7DFA9A08-1F84-4CF2-9E63-7F6E7C219F76}" type="pres">
-      <dgm:prSet presAssocID="{D39C6496-6307-4FC4-9D55-DB6DA94D051F}" presName="Name13" presStyleLbl="parChTrans1D2" presStyleIdx="4" presStyleCnt="11"/>
+      <dgm:prSet presAssocID="{D39C6496-6307-4FC4-9D55-DB6DA94D051F}" presName="Name13" presStyleLbl="parChTrans1D2" presStyleIdx="4" presStyleCnt="12"/>
       <dgm:spPr/>
     </dgm:pt>
     <dgm:pt modelId="{9C3E65C4-9266-43CB-B08F-79811ABF047A}" type="pres">
-      <dgm:prSet presAssocID="{A7945ECA-2D01-4C03-9AED-9E3EEAAF0F2C}" presName="childText" presStyleLbl="bgAcc1" presStyleIdx="4" presStyleCnt="11">
+      <dgm:prSet presAssocID="{A7945ECA-2D01-4C03-9AED-9E3EEAAF0F2C}" presName="childText" presStyleLbl="bgAcc1" presStyleIdx="4" presStyleCnt="12">
         <dgm:presLayoutVars>
           <dgm:bulletEnabled val="1"/>
         </dgm:presLayoutVars>
@@ -1631,11 +1667,23 @@
       <dgm:spPr/>
     </dgm:pt>
     <dgm:pt modelId="{16CFAB30-3E6A-44D7-A45D-E3066E142053}" type="pres">
-      <dgm:prSet presAssocID="{FD74BA91-6D78-44B3-BF01-4D49723F4718}" presName="Name13" presStyleLbl="parChTrans1D2" presStyleIdx="5" presStyleCnt="11"/>
+      <dgm:prSet presAssocID="{FD74BA91-6D78-44B3-BF01-4D49723F4718}" presName="Name13" presStyleLbl="parChTrans1D2" presStyleIdx="5" presStyleCnt="12"/>
       <dgm:spPr/>
     </dgm:pt>
     <dgm:pt modelId="{5F9726AA-E8AD-4C5C-A0CA-2350C4F8CAFA}" type="pres">
-      <dgm:prSet presAssocID="{B0B0FACC-C24A-4552-82AB-C8FE8246DEF8}" presName="childText" presStyleLbl="bgAcc1" presStyleIdx="5" presStyleCnt="11">
+      <dgm:prSet presAssocID="{B0B0FACC-C24A-4552-82AB-C8FE8246DEF8}" presName="childText" presStyleLbl="bgAcc1" presStyleIdx="5" presStyleCnt="12">
+        <dgm:presLayoutVars>
+          <dgm:bulletEnabled val="1"/>
+        </dgm:presLayoutVars>
+      </dgm:prSet>
+      <dgm:spPr/>
+    </dgm:pt>
+    <dgm:pt modelId="{98F5961E-009F-4B0E-B7E3-D6C73872AA97}" type="pres">
+      <dgm:prSet presAssocID="{5FEB1B6C-FFE0-497B-AC09-97C2A4F7BDF4}" presName="Name13" presStyleLbl="parChTrans1D2" presStyleIdx="6" presStyleCnt="12"/>
+      <dgm:spPr/>
+    </dgm:pt>
+    <dgm:pt modelId="{2751A39C-B58F-4C1E-93BD-4108C32E1751}" type="pres">
+      <dgm:prSet presAssocID="{2F5428A6-4B7D-4C0E-9CAB-79528BD25A97}" presName="childText" presStyleLbl="bgAcc1" presStyleIdx="6" presStyleCnt="12">
         <dgm:presLayoutVars>
           <dgm:bulletEnabled val="1"/>
         </dgm:presLayoutVars>
@@ -1643,11 +1691,11 @@
       <dgm:spPr/>
     </dgm:pt>
     <dgm:pt modelId="{0ECF28DA-9925-4B5B-97B1-BDA459502114}" type="pres">
-      <dgm:prSet presAssocID="{FA010E1E-46BF-40DE-B386-14C19C329E38}" presName="Name13" presStyleLbl="parChTrans1D2" presStyleIdx="6" presStyleCnt="11"/>
+      <dgm:prSet presAssocID="{FA010E1E-46BF-40DE-B386-14C19C329E38}" presName="Name13" presStyleLbl="parChTrans1D2" presStyleIdx="7" presStyleCnt="12"/>
       <dgm:spPr/>
     </dgm:pt>
     <dgm:pt modelId="{5A2BB121-DDEE-46A8-AC09-18496F773E62}" type="pres">
-      <dgm:prSet presAssocID="{3C02419B-DA6A-4FDB-972F-4F8DC3AD08E3}" presName="childText" presStyleLbl="bgAcc1" presStyleIdx="6" presStyleCnt="11">
+      <dgm:prSet presAssocID="{3C02419B-DA6A-4FDB-972F-4F8DC3AD08E3}" presName="childText" presStyleLbl="bgAcc1" presStyleIdx="7" presStyleCnt="12" custLinFactNeighborX="5500" custLinFactNeighborY="6167">
         <dgm:presLayoutVars>
           <dgm:bulletEnabled val="1"/>
         </dgm:presLayoutVars>
@@ -1675,11 +1723,11 @@
       <dgm:spPr/>
     </dgm:pt>
     <dgm:pt modelId="{278D3975-9588-4A95-85BD-D062BB0AE1A4}" type="pres">
-      <dgm:prSet presAssocID="{109F41A6-1D40-4F81-903A-8B0CB1E442DB}" presName="Name13" presStyleLbl="parChTrans1D2" presStyleIdx="7" presStyleCnt="11"/>
+      <dgm:prSet presAssocID="{109F41A6-1D40-4F81-903A-8B0CB1E442DB}" presName="Name13" presStyleLbl="parChTrans1D2" presStyleIdx="8" presStyleCnt="12"/>
       <dgm:spPr/>
     </dgm:pt>
     <dgm:pt modelId="{EDB6085A-8F2B-4B84-887D-9DD4BEC6E4E1}" type="pres">
-      <dgm:prSet presAssocID="{C217CF6C-69F6-4F1F-BFEF-F03F51825445}" presName="childText" presStyleLbl="bgAcc1" presStyleIdx="7" presStyleCnt="11">
+      <dgm:prSet presAssocID="{C217CF6C-69F6-4F1F-BFEF-F03F51825445}" presName="childText" presStyleLbl="bgAcc1" presStyleIdx="8" presStyleCnt="12">
         <dgm:presLayoutVars>
           <dgm:bulletEnabled val="1"/>
         </dgm:presLayoutVars>
@@ -1687,11 +1735,11 @@
       <dgm:spPr/>
     </dgm:pt>
     <dgm:pt modelId="{FF100697-267A-4BC5-8DA9-B1F7321DFE84}" type="pres">
-      <dgm:prSet presAssocID="{4B64BF35-F3DD-46FA-A74B-C8F1391BB234}" presName="Name13" presStyleLbl="parChTrans1D2" presStyleIdx="8" presStyleCnt="11"/>
+      <dgm:prSet presAssocID="{4B64BF35-F3DD-46FA-A74B-C8F1391BB234}" presName="Name13" presStyleLbl="parChTrans1D2" presStyleIdx="9" presStyleCnt="12"/>
       <dgm:spPr/>
     </dgm:pt>
     <dgm:pt modelId="{291D5A65-BA4D-4BF4-8D0F-050F9D81FBB6}" type="pres">
-      <dgm:prSet presAssocID="{D6553791-8532-4952-AC46-957A80E6F455}" presName="childText" presStyleLbl="bgAcc1" presStyleIdx="8" presStyleCnt="11">
+      <dgm:prSet presAssocID="{D6553791-8532-4952-AC46-957A80E6F455}" presName="childText" presStyleLbl="bgAcc1" presStyleIdx="9" presStyleCnt="12">
         <dgm:presLayoutVars>
           <dgm:bulletEnabled val="1"/>
         </dgm:presLayoutVars>
@@ -1699,11 +1747,11 @@
       <dgm:spPr/>
     </dgm:pt>
     <dgm:pt modelId="{6B27DFF3-3021-4E99-BF73-829A6255425D}" type="pres">
-      <dgm:prSet presAssocID="{E8807DF0-38BE-4236-AFC9-03DFA18007AA}" presName="Name13" presStyleLbl="parChTrans1D2" presStyleIdx="9" presStyleCnt="11"/>
+      <dgm:prSet presAssocID="{E8807DF0-38BE-4236-AFC9-03DFA18007AA}" presName="Name13" presStyleLbl="parChTrans1D2" presStyleIdx="10" presStyleCnt="12"/>
       <dgm:spPr/>
     </dgm:pt>
     <dgm:pt modelId="{88C17E61-7A2A-46D7-AC95-5E562286A33E}" type="pres">
-      <dgm:prSet presAssocID="{23FBFCAF-D268-4C4D-8359-092F33A19BD5}" presName="childText" presStyleLbl="bgAcc1" presStyleIdx="9" presStyleCnt="11">
+      <dgm:prSet presAssocID="{23FBFCAF-D268-4C4D-8359-092F33A19BD5}" presName="childText" presStyleLbl="bgAcc1" presStyleIdx="10" presStyleCnt="12">
         <dgm:presLayoutVars>
           <dgm:bulletEnabled val="1"/>
         </dgm:presLayoutVars>
@@ -1711,11 +1759,11 @@
       <dgm:spPr/>
     </dgm:pt>
     <dgm:pt modelId="{E8A2D34D-9B35-4804-BD08-DC4453907292}" type="pres">
-      <dgm:prSet presAssocID="{E61F56D0-9360-46BF-8251-561CA9F726E8}" presName="Name13" presStyleLbl="parChTrans1D2" presStyleIdx="10" presStyleCnt="11"/>
+      <dgm:prSet presAssocID="{E61F56D0-9360-46BF-8251-561CA9F726E8}" presName="Name13" presStyleLbl="parChTrans1D2" presStyleIdx="11" presStyleCnt="12"/>
       <dgm:spPr/>
     </dgm:pt>
     <dgm:pt modelId="{1B267FF2-7D4F-4C45-AA7C-4EA638A9F1C5}" type="pres">
-      <dgm:prSet presAssocID="{BE7D634C-5542-4AE8-B044-37802A6A19BF}" presName="childText" presStyleLbl="bgAcc1" presStyleIdx="10" presStyleCnt="11">
+      <dgm:prSet presAssocID="{BE7D634C-5542-4AE8-B044-37802A6A19BF}" presName="childText" presStyleLbl="bgAcc1" presStyleIdx="11" presStyleCnt="12">
         <dgm:presLayoutVars>
           <dgm:bulletEnabled val="1"/>
         </dgm:presLayoutVars>
@@ -1725,6 +1773,7 @@
   </dgm:ptLst>
   <dgm:cxnLst>
     <dgm:cxn modelId="{F8F3D917-317B-4A80-B606-277A7F6170C2}" srcId="{9AAB3432-E203-4861-9A1F-5A18DE81A0E0}" destId="{F221EA58-7488-4550-B7A5-965344CA7EAE}" srcOrd="1" destOrd="0" parTransId="{03056A9D-BCBF-4181-B8D6-7E4ECCBD4D9E}" sibTransId="{50012D0E-39A9-4FB4-832D-C4D74BE598A6}"/>
+    <dgm:cxn modelId="{DA3B2C23-3A2C-4ED9-9222-0DAC46EDEBD6}" type="presOf" srcId="{2F5428A6-4B7D-4C0E-9CAB-79528BD25A97}" destId="{2751A39C-B58F-4C1E-93BD-4108C32E1751}" srcOrd="0" destOrd="0" presId="urn:microsoft.com/office/officeart/2005/8/layout/hierarchy3"/>
     <dgm:cxn modelId="{B7B8BE25-1D3D-41C1-B2BB-252CA3FFFABF}" srcId="{5D17C516-2319-40FE-8748-E184C6D71444}" destId="{C217CF6C-69F6-4F1F-BFEF-F03F51825445}" srcOrd="0" destOrd="0" parTransId="{109F41A6-1D40-4F81-903A-8B0CB1E442DB}" sibTransId="{727D2815-3763-49AC-8FA5-B78975C6E255}"/>
     <dgm:cxn modelId="{918F4E28-6C57-4EFF-80BA-F57AC436CDC9}" type="presOf" srcId="{08AACE21-5FAD-4460-B120-67387C8F0F32}" destId="{F5AE7053-0C33-481C-8BFB-D2DAFB4C4294}" srcOrd="0" destOrd="0" presId="urn:microsoft.com/office/officeart/2005/8/layout/hierarchy3"/>
     <dgm:cxn modelId="{C679C12F-0D37-4771-853C-9B6A72F3F8AB}" srcId="{5D17C516-2319-40FE-8748-E184C6D71444}" destId="{23FBFCAF-D268-4C4D-8359-092F33A19BD5}" srcOrd="2" destOrd="0" parTransId="{E8807DF0-38BE-4236-AFC9-03DFA18007AA}" sibTransId="{49424D88-7251-4F7F-9D61-B03F29AB2536}"/>
@@ -1732,6 +1781,7 @@
     <dgm:cxn modelId="{7156E032-39F7-4DCF-A095-E4906170ABD1}" type="presOf" srcId="{C217CF6C-69F6-4F1F-BFEF-F03F51825445}" destId="{EDB6085A-8F2B-4B84-887D-9DD4BEC6E4E1}" srcOrd="0" destOrd="0" presId="urn:microsoft.com/office/officeart/2005/8/layout/hierarchy3"/>
     <dgm:cxn modelId="{77C2803F-5DCB-40EC-8837-BEA44757C328}" type="presOf" srcId="{B1CEE35E-20B6-4A0B-B1E8-D4F40E3162E1}" destId="{C5878689-67F2-4E3D-8C9B-392F50C32024}" srcOrd="0" destOrd="0" presId="urn:microsoft.com/office/officeart/2005/8/layout/hierarchy3"/>
     <dgm:cxn modelId="{3C31933F-6B34-49D4-B2D3-FA6BA454BF0B}" type="presOf" srcId="{3C02419B-DA6A-4FDB-972F-4F8DC3AD08E3}" destId="{5A2BB121-DDEE-46A8-AC09-18496F773E62}" srcOrd="0" destOrd="0" presId="urn:microsoft.com/office/officeart/2005/8/layout/hierarchy3"/>
+    <dgm:cxn modelId="{AA1BF140-67A4-4F19-A882-F5B0C6DCDE3F}" type="presOf" srcId="{5FEB1B6C-FFE0-497B-AC09-97C2A4F7BDF4}" destId="{98F5961E-009F-4B0E-B7E3-D6C73872AA97}" srcOrd="0" destOrd="0" presId="urn:microsoft.com/office/officeart/2005/8/layout/hierarchy3"/>
     <dgm:cxn modelId="{C906736A-EECE-4919-9DAA-28FE9DCB5675}" type="presOf" srcId="{5D17C516-2319-40FE-8748-E184C6D71444}" destId="{3DB7ADFA-DCAB-4034-9F43-B860EBE864E8}" srcOrd="0" destOrd="0" presId="urn:microsoft.com/office/officeart/2005/8/layout/hierarchy3"/>
     <dgm:cxn modelId="{0DEC854C-4194-43A5-8929-DF87D63D4D63}" type="presOf" srcId="{E61F56D0-9360-46BF-8251-561CA9F726E8}" destId="{E8A2D34D-9B35-4804-BD08-DC4453907292}" srcOrd="0" destOrd="0" presId="urn:microsoft.com/office/officeart/2005/8/layout/hierarchy3"/>
     <dgm:cxn modelId="{658D4F50-D710-4AB9-8265-F6A1451ABDAD}" type="presOf" srcId="{E8807DF0-38BE-4236-AFC9-03DFA18007AA}" destId="{6B27DFF3-3021-4E99-BF73-829A6255425D}" srcOrd="0" destOrd="0" presId="urn:microsoft.com/office/officeart/2005/8/layout/hierarchy3"/>
@@ -1739,6 +1789,7 @@
     <dgm:cxn modelId="{C6045752-28A9-4F08-8DE2-ADC62AB18265}" type="presOf" srcId="{109F41A6-1D40-4F81-903A-8B0CB1E442DB}" destId="{278D3975-9588-4A95-85BD-D062BB0AE1A4}" srcOrd="0" destOrd="0" presId="urn:microsoft.com/office/officeart/2005/8/layout/hierarchy3"/>
     <dgm:cxn modelId="{A598A554-6FB3-42AA-BB2F-C4DBF408EC24}" type="presOf" srcId="{A7945ECA-2D01-4C03-9AED-9E3EEAAF0F2C}" destId="{9C3E65C4-9266-43CB-B08F-79811ABF047A}" srcOrd="0" destOrd="0" presId="urn:microsoft.com/office/officeart/2005/8/layout/hierarchy3"/>
     <dgm:cxn modelId="{47968857-87E3-481A-908A-A468E51372C1}" srcId="{9AAB3432-E203-4861-9A1F-5A18DE81A0E0}" destId="{B1CEE35E-20B6-4A0B-B1E8-D4F40E3162E1}" srcOrd="2" destOrd="0" parTransId="{08AACE21-5FAD-4460-B120-67387C8F0F32}" sibTransId="{4A08DEA0-C75B-4713-B280-420C60C372D9}"/>
+    <dgm:cxn modelId="{89929C80-2DC0-4D55-A509-D03B65DF1DA5}" srcId="{ED0B78BF-E006-4732-B48C-2ADC9E2EF39A}" destId="{2F5428A6-4B7D-4C0E-9CAB-79528BD25A97}" srcOrd="3" destOrd="0" parTransId="{5FEB1B6C-FFE0-497B-AC09-97C2A4F7BDF4}" sibTransId="{F7A995F7-0D98-4650-B482-7B23AA209241}"/>
     <dgm:cxn modelId="{A3550B88-A4A2-4C55-8EEF-D8696D63FDCA}" type="presOf" srcId="{23FBFCAF-D268-4C4D-8359-092F33A19BD5}" destId="{88C17E61-7A2A-46D7-AC95-5E562286A33E}" srcOrd="0" destOrd="0" presId="urn:microsoft.com/office/officeart/2005/8/layout/hierarchy3"/>
     <dgm:cxn modelId="{22964D88-0DC4-4B3C-A8CE-48EA0783D709}" type="presOf" srcId="{9AAB3432-E203-4861-9A1F-5A18DE81A0E0}" destId="{D5FEF17D-A657-4E90-83A6-FFBD9375BEE2}" srcOrd="1" destOrd="0" presId="urn:microsoft.com/office/officeart/2005/8/layout/hierarchy3"/>
     <dgm:cxn modelId="{9662958D-3400-409A-ADC7-BEB605777B1F}" srcId="{ED0B78BF-E006-4732-B48C-2ADC9E2EF39A}" destId="{1CBBDDB5-026A-42BF-8805-ACAC57AA5DC3}" srcOrd="0" destOrd="0" parTransId="{1EC30C20-D36E-4265-85EE-C210CE02F892}" sibTransId="{D37EB34B-12D7-42C6-A433-F33F271349CA}"/>
@@ -1747,7 +1798,7 @@
     <dgm:cxn modelId="{FAC6949B-B633-43AF-9BCB-483138B18D3F}" type="presOf" srcId="{FA010E1E-46BF-40DE-B386-14C19C329E38}" destId="{0ECF28DA-9925-4B5B-97B1-BDA459502114}" srcOrd="0" destOrd="0" presId="urn:microsoft.com/office/officeart/2005/8/layout/hierarchy3"/>
     <dgm:cxn modelId="{8B495D9D-5B75-4B97-8FE7-54F24CED5860}" type="presOf" srcId="{1CBBDDB5-026A-42BF-8805-ACAC57AA5DC3}" destId="{3B0CF9DF-CC55-47FF-BECE-903E70F9D2DE}" srcOrd="0" destOrd="0" presId="urn:microsoft.com/office/officeart/2005/8/layout/hierarchy3"/>
     <dgm:cxn modelId="{F9A2BA9E-B30D-4948-A3E9-A634F6BE47FD}" srcId="{D4ADF4FB-6626-4BAA-8170-1AB86830E7EB}" destId="{5D17C516-2319-40FE-8748-E184C6D71444}" srcOrd="2" destOrd="0" parTransId="{EA441DC7-A30D-47EC-A5C8-C50834D06E30}" sibTransId="{636B54D7-340F-4600-82E5-F2E670443C91}"/>
-    <dgm:cxn modelId="{B2581BA3-7711-4B4F-895A-5C4A1A23D07A}" srcId="{ED0B78BF-E006-4732-B48C-2ADC9E2EF39A}" destId="{3C02419B-DA6A-4FDB-972F-4F8DC3AD08E3}" srcOrd="3" destOrd="0" parTransId="{FA010E1E-46BF-40DE-B386-14C19C329E38}" sibTransId="{ABE6B4B2-8044-42FC-8EBA-A2B2927B372D}"/>
+    <dgm:cxn modelId="{B2581BA3-7711-4B4F-895A-5C4A1A23D07A}" srcId="{ED0B78BF-E006-4732-B48C-2ADC9E2EF39A}" destId="{3C02419B-DA6A-4FDB-972F-4F8DC3AD08E3}" srcOrd="4" destOrd="0" parTransId="{FA010E1E-46BF-40DE-B386-14C19C329E38}" sibTransId="{ABE6B4B2-8044-42FC-8EBA-A2B2927B372D}"/>
     <dgm:cxn modelId="{17D275A3-9BBB-4EF7-8582-F13F0E98BB5D}" type="presOf" srcId="{ED0B78BF-E006-4732-B48C-2ADC9E2EF39A}" destId="{F1C18E15-3E91-476D-8B13-25AD56BC4B13}" srcOrd="0" destOrd="0" presId="urn:microsoft.com/office/officeart/2005/8/layout/hierarchy3"/>
     <dgm:cxn modelId="{29461AA4-85D3-4C91-9D68-226BD6D7500F}" type="presOf" srcId="{DDB8B436-9528-434E-BD0F-6EB4D2ACB929}" destId="{7E3D7089-292B-46E8-B4F0-ADC3733C52BD}" srcOrd="0" destOrd="0" presId="urn:microsoft.com/office/officeart/2005/8/layout/hierarchy3"/>
     <dgm:cxn modelId="{6F0A8CA4-3728-4E60-8471-7CAB7A834900}" type="presOf" srcId="{F221EA58-7488-4550-B7A5-965344CA7EAE}" destId="{CF0B1CD2-0FC3-49A4-A520-B01A6C3CCB95}" srcOrd="0" destOrd="0" presId="urn:microsoft.com/office/officeart/2005/8/layout/hierarchy3"/>
@@ -1789,8 +1840,10 @@
     <dgm:cxn modelId="{D1011F87-5E28-4D3F-8118-4BA6A4FEA06E}" type="presParOf" srcId="{5E7F2D45-2508-495B-A708-02E0FD5F2314}" destId="{9C3E65C4-9266-43CB-B08F-79811ABF047A}" srcOrd="3" destOrd="0" presId="urn:microsoft.com/office/officeart/2005/8/layout/hierarchy3"/>
     <dgm:cxn modelId="{B64B3C35-7E92-47FF-A43C-7E75EABB7DE0}" type="presParOf" srcId="{5E7F2D45-2508-495B-A708-02E0FD5F2314}" destId="{16CFAB30-3E6A-44D7-A45D-E3066E142053}" srcOrd="4" destOrd="0" presId="urn:microsoft.com/office/officeart/2005/8/layout/hierarchy3"/>
     <dgm:cxn modelId="{86D49351-D3C9-48A1-88EA-44A93353F587}" type="presParOf" srcId="{5E7F2D45-2508-495B-A708-02E0FD5F2314}" destId="{5F9726AA-E8AD-4C5C-A0CA-2350C4F8CAFA}" srcOrd="5" destOrd="0" presId="urn:microsoft.com/office/officeart/2005/8/layout/hierarchy3"/>
-    <dgm:cxn modelId="{91C1DB7D-DADE-48E1-9C3F-D33F6FC84386}" type="presParOf" srcId="{5E7F2D45-2508-495B-A708-02E0FD5F2314}" destId="{0ECF28DA-9925-4B5B-97B1-BDA459502114}" srcOrd="6" destOrd="0" presId="urn:microsoft.com/office/officeart/2005/8/layout/hierarchy3"/>
-    <dgm:cxn modelId="{7A09BA7C-9EDC-496E-8A6D-4B0744B8C88D}" type="presParOf" srcId="{5E7F2D45-2508-495B-A708-02E0FD5F2314}" destId="{5A2BB121-DDEE-46A8-AC09-18496F773E62}" srcOrd="7" destOrd="0" presId="urn:microsoft.com/office/officeart/2005/8/layout/hierarchy3"/>
+    <dgm:cxn modelId="{8B0171C0-5450-460E-AE4D-3268B939CEE2}" type="presParOf" srcId="{5E7F2D45-2508-495B-A708-02E0FD5F2314}" destId="{98F5961E-009F-4B0E-B7E3-D6C73872AA97}" srcOrd="6" destOrd="0" presId="urn:microsoft.com/office/officeart/2005/8/layout/hierarchy3"/>
+    <dgm:cxn modelId="{6C673602-5C94-4CEF-8ABF-08D782366BA0}" type="presParOf" srcId="{5E7F2D45-2508-495B-A708-02E0FD5F2314}" destId="{2751A39C-B58F-4C1E-93BD-4108C32E1751}" srcOrd="7" destOrd="0" presId="urn:microsoft.com/office/officeart/2005/8/layout/hierarchy3"/>
+    <dgm:cxn modelId="{91C1DB7D-DADE-48E1-9C3F-D33F6FC84386}" type="presParOf" srcId="{5E7F2D45-2508-495B-A708-02E0FD5F2314}" destId="{0ECF28DA-9925-4B5B-97B1-BDA459502114}" srcOrd="8" destOrd="0" presId="urn:microsoft.com/office/officeart/2005/8/layout/hierarchy3"/>
+    <dgm:cxn modelId="{7A09BA7C-9EDC-496E-8A6D-4B0744B8C88D}" type="presParOf" srcId="{5E7F2D45-2508-495B-A708-02E0FD5F2314}" destId="{5A2BB121-DDEE-46A8-AC09-18496F773E62}" srcOrd="9" destOrd="0" presId="urn:microsoft.com/office/officeart/2005/8/layout/hierarchy3"/>
     <dgm:cxn modelId="{F5B8C0DF-97A3-423B-9A5D-53FC91FEE07D}" type="presParOf" srcId="{5EAC0F1C-8135-499C-A050-8951C4D4D68B}" destId="{59FB6EFF-035B-4901-8C84-3BDEA8130465}" srcOrd="2" destOrd="0" presId="urn:microsoft.com/office/officeart/2005/8/layout/hierarchy3"/>
     <dgm:cxn modelId="{2C3BEA50-80F2-41C7-A82B-5C3E16FC0BD9}" type="presParOf" srcId="{59FB6EFF-035B-4901-8C84-3BDEA8130465}" destId="{DFAAFD62-220C-47EA-B1FF-1D698C1D9D0C}" srcOrd="0" destOrd="0" presId="urn:microsoft.com/office/officeart/2005/8/layout/hierarchy3"/>
     <dgm:cxn modelId="{5783CD70-7213-4FC1-AF68-237D5BC3062A}" type="presParOf" srcId="{DFAAFD62-220C-47EA-B1FF-1D698C1D9D0C}" destId="{3DB7ADFA-DCAB-4034-9F43-B860EBE864E8}" srcOrd="0" destOrd="0" presId="urn:microsoft.com/office/officeart/2005/8/layout/hierarchy3"/>
@@ -1809,7 +1862,7 @@
   <dgm:whole/>
   <dgm:extLst>
     <a:ext uri="http://schemas.microsoft.com/office/drawing/2008/diagram">
-      <dsp:dataModelExt xmlns:dsp="http://schemas.microsoft.com/office/drawing/2008/diagram" relId="rId6" minVer="http://schemas.openxmlformats.org/drawingml/2006/diagram"/>
+      <dsp:dataModelExt xmlns:dsp="http://schemas.microsoft.com/office/drawing/2008/diagram" relId="rId7" minVer="http://schemas.openxmlformats.org/drawingml/2006/diagram"/>
     </a:ext>
   </dgm:extLst>
 </dgm:dataModel>
@@ -1830,8 +1883,8 @@
       </dsp:nvSpPr>
       <dsp:spPr>
         <a:xfrm>
-          <a:off x="529456" y="248"/>
-          <a:ext cx="1439167" cy="719583"/>
+          <a:off x="719583" y="1029"/>
+          <a:ext cx="1330523" cy="665261"/>
         </a:xfrm>
         <a:prstGeom prst="roundRect">
           <a:avLst>
@@ -1874,12 +1927,12 @@
         </a:fontRef>
       </dsp:style>
       <dsp:txBody>
-        <a:bodyPr spcFirstLastPara="0" vert="horz" wrap="square" lIns="28575" tIns="19050" rIns="28575" bIns="19050" numCol="1" spcCol="1270" anchor="ctr" anchorCtr="0">
+        <a:bodyPr spcFirstLastPara="0" vert="horz" wrap="square" lIns="26670" tIns="17780" rIns="26670" bIns="17780" numCol="1" spcCol="1270" anchor="ctr" anchorCtr="0">
           <a:noAutofit/>
         </a:bodyPr>
         <a:lstStyle/>
         <a:p>
-          <a:pPr marL="0" lvl="0" indent="0" algn="ctr" defTabSz="666750">
+          <a:pPr marL="0" lvl="0" indent="0" algn="ctr" defTabSz="622300">
             <a:lnSpc>
               <a:spcPct val="90000"/>
             </a:lnSpc>
@@ -1892,14 +1945,14 @@
             <a:buNone/>
           </a:pPr>
           <a:r>
-            <a:rPr lang="en-US" sz="1500" kern="1200" dirty="0"/>
+            <a:rPr lang="en-US" sz="1400" kern="1200" dirty="0"/>
             <a:t>Basic Principles</a:t>
           </a:r>
         </a:p>
       </dsp:txBody>
       <dsp:txXfrm>
-        <a:off x="550532" y="21324"/>
-        <a:ext cx="1397015" cy="677431"/>
+        <a:off x="739068" y="20514"/>
+        <a:ext cx="1291553" cy="626291"/>
       </dsp:txXfrm>
     </dsp:sp>
     <dsp:sp modelId="{360B229B-0F55-45E5-A55A-DDDBDBD1C921}">
@@ -1909,8 +1962,8 @@
       </dsp:nvSpPr>
       <dsp:spPr>
         <a:xfrm>
-          <a:off x="673372" y="719832"/>
-          <a:ext cx="143916" cy="539687"/>
+          <a:off x="852636" y="666290"/>
+          <a:ext cx="133052" cy="498946"/>
         </a:xfrm>
         <a:custGeom>
           <a:avLst/>
@@ -1924,10 +1977,10 @@
                 <a:pt x="0" y="0"/>
               </a:moveTo>
               <a:lnTo>
-                <a:pt x="0" y="539687"/>
+                <a:pt x="0" y="498946"/>
               </a:lnTo>
               <a:lnTo>
-                <a:pt x="143916" y="539687"/>
+                <a:pt x="133052" y="498946"/>
               </a:lnTo>
             </a:path>
           </a:pathLst>
@@ -1967,8 +2020,8 @@
       </dsp:nvSpPr>
       <dsp:spPr>
         <a:xfrm>
-          <a:off x="817289" y="899728"/>
-          <a:ext cx="1151334" cy="719583"/>
+          <a:off x="985688" y="832606"/>
+          <a:ext cx="1064418" cy="665261"/>
         </a:xfrm>
         <a:prstGeom prst="roundRect">
           <a:avLst>
@@ -2000,12 +2053,12 @@
         </a:fontRef>
       </dsp:style>
       <dsp:txBody>
-        <a:bodyPr spcFirstLastPara="0" vert="horz" wrap="square" lIns="28575" tIns="19050" rIns="28575" bIns="19050" numCol="1" spcCol="1270" anchor="ctr" anchorCtr="0">
+        <a:bodyPr spcFirstLastPara="0" vert="horz" wrap="square" lIns="20955" tIns="13970" rIns="20955" bIns="13970" numCol="1" spcCol="1270" anchor="ctr" anchorCtr="0">
           <a:noAutofit/>
         </a:bodyPr>
         <a:lstStyle/>
         <a:p>
-          <a:pPr marL="0" lvl="0" indent="0" algn="ctr" defTabSz="666750">
+          <a:pPr marL="0" lvl="0" indent="0" algn="ctr" defTabSz="488950">
             <a:lnSpc>
               <a:spcPct val="90000"/>
             </a:lnSpc>
@@ -2018,14 +2071,14 @@
             <a:buNone/>
           </a:pPr>
           <a:r>
-            <a:rPr lang="en-US" sz="1500" kern="1200" dirty="0"/>
+            <a:rPr lang="en-US" sz="1100" kern="1200" dirty="0"/>
             <a:t>Designing Data</a:t>
           </a:r>
         </a:p>
       </dsp:txBody>
       <dsp:txXfrm>
-        <a:off x="838365" y="920804"/>
-        <a:ext cx="1109182" cy="677431"/>
+        <a:off x="1005173" y="852091"/>
+        <a:ext cx="1025448" cy="626291"/>
       </dsp:txXfrm>
     </dsp:sp>
     <dsp:sp modelId="{BC1B1EA4-129C-44F6-935B-BA646A7A2AA3}">
@@ -2035,8 +2088,8 @@
       </dsp:nvSpPr>
       <dsp:spPr>
         <a:xfrm>
-          <a:off x="673372" y="719832"/>
-          <a:ext cx="143916" cy="1439167"/>
+          <a:off x="852636" y="666290"/>
+          <a:ext cx="133052" cy="1330523"/>
         </a:xfrm>
         <a:custGeom>
           <a:avLst/>
@@ -2050,10 +2103,10 @@
                 <a:pt x="0" y="0"/>
               </a:moveTo>
               <a:lnTo>
-                <a:pt x="0" y="1439167"/>
+                <a:pt x="0" y="1330523"/>
               </a:lnTo>
               <a:lnTo>
-                <a:pt x="143916" y="1439167"/>
+                <a:pt x="133052" y="1330523"/>
               </a:lnTo>
             </a:path>
           </a:pathLst>
@@ -2093,8 +2146,8 @@
       </dsp:nvSpPr>
       <dsp:spPr>
         <a:xfrm>
-          <a:off x="817289" y="1799208"/>
-          <a:ext cx="1151334" cy="719583"/>
+          <a:off x="985688" y="1664183"/>
+          <a:ext cx="1064418" cy="665261"/>
         </a:xfrm>
         <a:prstGeom prst="roundRect">
           <a:avLst>
@@ -2126,12 +2179,12 @@
         </a:fontRef>
       </dsp:style>
       <dsp:txBody>
-        <a:bodyPr spcFirstLastPara="0" vert="horz" wrap="square" lIns="28575" tIns="19050" rIns="28575" bIns="19050" numCol="1" spcCol="1270" anchor="ctr" anchorCtr="0">
+        <a:bodyPr spcFirstLastPara="0" vert="horz" wrap="square" lIns="20955" tIns="13970" rIns="20955" bIns="13970" numCol="1" spcCol="1270" anchor="ctr" anchorCtr="0">
           <a:noAutofit/>
         </a:bodyPr>
         <a:lstStyle/>
         <a:p>
-          <a:pPr marL="0" lvl="0" indent="0" algn="ctr" defTabSz="666750">
+          <a:pPr marL="0" lvl="0" indent="0" algn="ctr" defTabSz="488950">
             <a:lnSpc>
               <a:spcPct val="90000"/>
             </a:lnSpc>
@@ -2144,14 +2197,14 @@
             <a:buNone/>
           </a:pPr>
           <a:r>
-            <a:rPr lang="en-US" sz="1500" kern="1200" dirty="0"/>
+            <a:rPr lang="en-US" sz="1100" kern="1200" dirty="0"/>
             <a:t>Designing Functions</a:t>
           </a:r>
         </a:p>
       </dsp:txBody>
       <dsp:txXfrm>
-        <a:off x="838365" y="1820284"/>
-        <a:ext cx="1109182" cy="677431"/>
+        <a:off x="1005173" y="1683668"/>
+        <a:ext cx="1025448" cy="626291"/>
       </dsp:txXfrm>
     </dsp:sp>
     <dsp:sp modelId="{F5AE7053-0C33-481C-8BFB-D2DAFB4C4294}">
@@ -2161,8 +2214,8 @@
       </dsp:nvSpPr>
       <dsp:spPr>
         <a:xfrm>
-          <a:off x="673372" y="719832"/>
-          <a:ext cx="143916" cy="2338647"/>
+          <a:off x="852636" y="666290"/>
+          <a:ext cx="133052" cy="2162100"/>
         </a:xfrm>
         <a:custGeom>
           <a:avLst/>
@@ -2176,10 +2229,10 @@
                 <a:pt x="0" y="0"/>
               </a:moveTo>
               <a:lnTo>
-                <a:pt x="0" y="2338647"/>
+                <a:pt x="0" y="2162100"/>
               </a:lnTo>
               <a:lnTo>
-                <a:pt x="143916" y="2338647"/>
+                <a:pt x="133052" y="2162100"/>
               </a:lnTo>
             </a:path>
           </a:pathLst>
@@ -2219,8 +2272,8 @@
       </dsp:nvSpPr>
       <dsp:spPr>
         <a:xfrm>
-          <a:off x="817289" y="2698687"/>
-          <a:ext cx="1151334" cy="719583"/>
+          <a:off x="985688" y="2495760"/>
+          <a:ext cx="1064418" cy="665261"/>
         </a:xfrm>
         <a:prstGeom prst="roundRect">
           <a:avLst>
@@ -2262,12 +2315,12 @@
         <a:fontRef idx="minor"/>
       </dsp:style>
       <dsp:txBody>
-        <a:bodyPr spcFirstLastPara="0" vert="horz" wrap="square" lIns="28575" tIns="19050" rIns="28575" bIns="19050" numCol="1" spcCol="1270" anchor="ctr" anchorCtr="0">
+        <a:bodyPr spcFirstLastPara="0" vert="horz" wrap="square" lIns="20955" tIns="13970" rIns="20955" bIns="13970" numCol="1" spcCol="1270" anchor="ctr" anchorCtr="0">
           <a:noAutofit/>
         </a:bodyPr>
         <a:lstStyle/>
         <a:p>
-          <a:pPr marL="0" lvl="0" indent="0" algn="ctr" defTabSz="666750">
+          <a:pPr marL="0" lvl="0" indent="0" algn="ctr" defTabSz="488950">
             <a:lnSpc>
               <a:spcPct val="90000"/>
             </a:lnSpc>
@@ -2280,14 +2333,14 @@
             <a:buNone/>
           </a:pPr>
           <a:r>
-            <a:rPr lang="en-US" sz="1500" kern="1200" dirty="0"/>
+            <a:rPr lang="en-US" sz="1100" kern="1200" dirty="0"/>
             <a:t>Designing Systems</a:t>
           </a:r>
         </a:p>
       </dsp:txBody>
       <dsp:txXfrm>
-        <a:off x="838365" y="2719763"/>
-        <a:ext cx="1109182" cy="677431"/>
+        <a:off x="1005173" y="2515245"/>
+        <a:ext cx="1025448" cy="626291"/>
       </dsp:txXfrm>
     </dsp:sp>
     <dsp:sp modelId="{F1C18E15-3E91-476D-8B13-25AD56BC4B13}">
@@ -2297,8 +2350,8 @@
       </dsp:nvSpPr>
       <dsp:spPr>
         <a:xfrm>
-          <a:off x="2328416" y="248"/>
-          <a:ext cx="1439167" cy="719583"/>
+          <a:off x="2382738" y="1029"/>
+          <a:ext cx="1330523" cy="665261"/>
         </a:xfrm>
         <a:prstGeom prst="roundRect">
           <a:avLst>
@@ -2341,12 +2394,12 @@
         </a:fontRef>
       </dsp:style>
       <dsp:txBody>
-        <a:bodyPr spcFirstLastPara="0" vert="horz" wrap="square" lIns="28575" tIns="19050" rIns="28575" bIns="19050" numCol="1" spcCol="1270" anchor="ctr" anchorCtr="0">
+        <a:bodyPr spcFirstLastPara="0" vert="horz" wrap="square" lIns="26670" tIns="17780" rIns="26670" bIns="17780" numCol="1" spcCol="1270" anchor="ctr" anchorCtr="0">
           <a:noAutofit/>
         </a:bodyPr>
         <a:lstStyle/>
         <a:p>
-          <a:pPr marL="0" lvl="0" indent="0" algn="ctr" defTabSz="666750">
+          <a:pPr marL="0" lvl="0" indent="0" algn="ctr" defTabSz="622300">
             <a:lnSpc>
               <a:spcPct val="90000"/>
             </a:lnSpc>
@@ -2359,14 +2412,14 @@
             <a:buNone/>
           </a:pPr>
           <a:r>
-            <a:rPr lang="en-US" sz="1500" kern="1200" dirty="0"/>
+            <a:rPr lang="en-US" sz="1400" kern="1200" dirty="0"/>
             <a:t>Tools and Techniques</a:t>
           </a:r>
         </a:p>
       </dsp:txBody>
       <dsp:txXfrm>
-        <a:off x="2349492" y="21324"/>
-        <a:ext cx="1397015" cy="677431"/>
+        <a:off x="2402223" y="20514"/>
+        <a:ext cx="1291553" cy="626291"/>
       </dsp:txXfrm>
     </dsp:sp>
     <dsp:sp modelId="{2564A6E5-875B-4BC6-B983-AA12C064A019}">
@@ -2376,8 +2429,8 @@
       </dsp:nvSpPr>
       <dsp:spPr>
         <a:xfrm>
-          <a:off x="2472332" y="719832"/>
-          <a:ext cx="143916" cy="539687"/>
+          <a:off x="2515790" y="666290"/>
+          <a:ext cx="133052" cy="498946"/>
         </a:xfrm>
         <a:custGeom>
           <a:avLst/>
@@ -2391,10 +2444,10 @@
                 <a:pt x="0" y="0"/>
               </a:moveTo>
               <a:lnTo>
-                <a:pt x="0" y="539687"/>
+                <a:pt x="0" y="498946"/>
               </a:lnTo>
               <a:lnTo>
-                <a:pt x="143916" y="539687"/>
+                <a:pt x="133052" y="498946"/>
               </a:lnTo>
             </a:path>
           </a:pathLst>
@@ -2434,8 +2487,8 @@
       </dsp:nvSpPr>
       <dsp:spPr>
         <a:xfrm>
-          <a:off x="2616249" y="899728"/>
-          <a:ext cx="1151334" cy="719583"/>
+          <a:off x="2648842" y="832606"/>
+          <a:ext cx="1064418" cy="665261"/>
         </a:xfrm>
         <a:prstGeom prst="roundRect">
           <a:avLst>
@@ -2477,12 +2530,12 @@
         <a:fontRef idx="minor"/>
       </dsp:style>
       <dsp:txBody>
-        <a:bodyPr spcFirstLastPara="0" vert="horz" wrap="square" lIns="28575" tIns="19050" rIns="28575" bIns="19050" numCol="1" spcCol="1270" anchor="ctr" anchorCtr="0">
+        <a:bodyPr spcFirstLastPara="0" vert="horz" wrap="square" lIns="20955" tIns="13970" rIns="20955" bIns="13970" numCol="1" spcCol="1270" anchor="ctr" anchorCtr="0">
           <a:noAutofit/>
         </a:bodyPr>
         <a:lstStyle/>
         <a:p>
-          <a:pPr marL="0" lvl="0" indent="0" algn="ctr" defTabSz="666750">
+          <a:pPr marL="0" lvl="0" indent="0" algn="ctr" defTabSz="488950">
             <a:lnSpc>
               <a:spcPct val="90000"/>
             </a:lnSpc>
@@ -2495,14 +2548,14 @@
             <a:buNone/>
           </a:pPr>
           <a:r>
-            <a:rPr lang="en-US" sz="1500" kern="1200" dirty="0"/>
+            <a:rPr lang="en-US" sz="1100" kern="1200" dirty="0"/>
             <a:t>Computing with Lists</a:t>
           </a:r>
         </a:p>
       </dsp:txBody>
       <dsp:txXfrm>
-        <a:off x="2637325" y="920804"/>
-        <a:ext cx="1109182" cy="677431"/>
+        <a:off x="2668327" y="852091"/>
+        <a:ext cx="1025448" cy="626291"/>
       </dsp:txXfrm>
     </dsp:sp>
     <dsp:sp modelId="{7DFA9A08-1F84-4CF2-9E63-7F6E7C219F76}">
@@ -2512,8 +2565,8 @@
       </dsp:nvSpPr>
       <dsp:spPr>
         <a:xfrm>
-          <a:off x="2472332" y="719832"/>
-          <a:ext cx="143916" cy="1439167"/>
+          <a:off x="2515790" y="666290"/>
+          <a:ext cx="133052" cy="1330523"/>
         </a:xfrm>
         <a:custGeom>
           <a:avLst/>
@@ -2527,10 +2580,10 @@
                 <a:pt x="0" y="0"/>
               </a:moveTo>
               <a:lnTo>
-                <a:pt x="0" y="1439167"/>
+                <a:pt x="0" y="1330523"/>
               </a:lnTo>
               <a:lnTo>
-                <a:pt x="143916" y="1439167"/>
+                <a:pt x="133052" y="1330523"/>
               </a:lnTo>
             </a:path>
           </a:pathLst>
@@ -2570,8 +2623,8 @@
       </dsp:nvSpPr>
       <dsp:spPr>
         <a:xfrm>
-          <a:off x="2616249" y="1799208"/>
-          <a:ext cx="1151334" cy="719583"/>
+          <a:off x="2648842" y="1664183"/>
+          <a:ext cx="1064418" cy="665261"/>
         </a:xfrm>
         <a:prstGeom prst="roundRect">
           <a:avLst>
@@ -2613,12 +2666,12 @@
         <a:fontRef idx="minor"/>
       </dsp:style>
       <dsp:txBody>
-        <a:bodyPr spcFirstLastPara="0" vert="horz" wrap="square" lIns="28575" tIns="19050" rIns="28575" bIns="19050" numCol="1" spcCol="1270" anchor="ctr" anchorCtr="0">
+        <a:bodyPr spcFirstLastPara="0" vert="horz" wrap="square" lIns="20955" tIns="13970" rIns="20955" bIns="13970" numCol="1" spcCol="1270" anchor="ctr" anchorCtr="0">
           <a:noAutofit/>
         </a:bodyPr>
         <a:lstStyle/>
         <a:p>
-          <a:pPr marL="0" lvl="0" indent="0" algn="ctr" defTabSz="666750">
+          <a:pPr marL="0" lvl="0" indent="0" algn="ctr" defTabSz="488950">
             <a:lnSpc>
               <a:spcPct val="90000"/>
             </a:lnSpc>
@@ -2631,14 +2684,14 @@
             <a:buNone/>
           </a:pPr>
           <a:r>
-            <a:rPr lang="en-US" sz="1500" kern="1200" dirty="0"/>
+            <a:rPr lang="en-US" sz="1100" kern="1200" dirty="0"/>
             <a:t>Computing with Trees and Graphs</a:t>
           </a:r>
         </a:p>
       </dsp:txBody>
       <dsp:txXfrm>
-        <a:off x="2637325" y="1820284"/>
-        <a:ext cx="1109182" cy="677431"/>
+        <a:off x="2668327" y="1683668"/>
+        <a:ext cx="1025448" cy="626291"/>
       </dsp:txXfrm>
     </dsp:sp>
     <dsp:sp modelId="{16CFAB30-3E6A-44D7-A45D-E3066E142053}">
@@ -2648,8 +2701,8 @@
       </dsp:nvSpPr>
       <dsp:spPr>
         <a:xfrm>
-          <a:off x="2472332" y="719832"/>
-          <a:ext cx="143916" cy="2338647"/>
+          <a:off x="2515790" y="666290"/>
+          <a:ext cx="133052" cy="2162100"/>
         </a:xfrm>
         <a:custGeom>
           <a:avLst/>
@@ -2663,10 +2716,10 @@
                 <a:pt x="0" y="0"/>
               </a:moveTo>
               <a:lnTo>
-                <a:pt x="0" y="2338647"/>
+                <a:pt x="0" y="2162100"/>
               </a:lnTo>
               <a:lnTo>
-                <a:pt x="143916" y="2338647"/>
+                <a:pt x="133052" y="2162100"/>
               </a:lnTo>
             </a:path>
           </a:pathLst>
@@ -2706,8 +2759,8 @@
       </dsp:nvSpPr>
       <dsp:spPr>
         <a:xfrm>
-          <a:off x="2616249" y="2698687"/>
-          <a:ext cx="1151334" cy="719583"/>
+          <a:off x="2648842" y="2495760"/>
+          <a:ext cx="1064418" cy="665261"/>
         </a:xfrm>
         <a:prstGeom prst="roundRect">
           <a:avLst>
@@ -2749,12 +2802,12 @@
         <a:fontRef idx="minor"/>
       </dsp:style>
       <dsp:txBody>
-        <a:bodyPr spcFirstLastPara="0" vert="horz" wrap="square" lIns="28575" tIns="19050" rIns="28575" bIns="19050" numCol="1" spcCol="1270" anchor="ctr" anchorCtr="0">
+        <a:bodyPr spcFirstLastPara="0" vert="horz" wrap="square" lIns="20955" tIns="13970" rIns="20955" bIns="13970" numCol="1" spcCol="1270" anchor="ctr" anchorCtr="0">
           <a:noAutofit/>
         </a:bodyPr>
         <a:lstStyle/>
         <a:p>
-          <a:pPr marL="0" lvl="0" indent="0" algn="ctr" defTabSz="666750">
+          <a:pPr marL="0" lvl="0" indent="0" algn="ctr" defTabSz="488950">
             <a:lnSpc>
               <a:spcPct val="90000"/>
             </a:lnSpc>
@@ -2767,25 +2820,25 @@
             <a:buNone/>
           </a:pPr>
           <a:r>
-            <a:rPr lang="en-US" sz="1500" kern="1200" dirty="0"/>
+            <a:rPr lang="en-US" sz="1100" kern="1200" dirty="0"/>
             <a:t>Designing with Invariants</a:t>
           </a:r>
         </a:p>
       </dsp:txBody>
       <dsp:txXfrm>
-        <a:off x="2637325" y="2719763"/>
-        <a:ext cx="1109182" cy="677431"/>
+        <a:off x="2668327" y="2515245"/>
+        <a:ext cx="1025448" cy="626291"/>
       </dsp:txXfrm>
     </dsp:sp>
-    <dsp:sp modelId="{0ECF28DA-9925-4B5B-97B1-BDA459502114}">
+    <dsp:sp modelId="{98F5961E-009F-4B0E-B7E3-D6C73872AA97}">
       <dsp:nvSpPr>
         <dsp:cNvPr id="0" name=""/>
         <dsp:cNvSpPr/>
       </dsp:nvSpPr>
       <dsp:spPr>
         <a:xfrm>
-          <a:off x="2472332" y="719832"/>
-          <a:ext cx="143916" cy="3238127"/>
+          <a:off x="2515790" y="666290"/>
+          <a:ext cx="133052" cy="2993677"/>
         </a:xfrm>
         <a:custGeom>
           <a:avLst/>
@@ -2799,10 +2852,10 @@
                 <a:pt x="0" y="0"/>
               </a:moveTo>
               <a:lnTo>
-                <a:pt x="0" y="3238127"/>
+                <a:pt x="0" y="2993677"/>
               </a:lnTo>
               <a:lnTo>
-                <a:pt x="143916" y="3238127"/>
+                <a:pt x="133052" y="2993677"/>
               </a:lnTo>
             </a:path>
           </a:pathLst>
@@ -2835,15 +2888,15 @@
         <a:fontRef idx="minor"/>
       </dsp:style>
     </dsp:sp>
-    <dsp:sp modelId="{5A2BB121-DDEE-46A8-AC09-18496F773E62}">
+    <dsp:sp modelId="{2751A39C-B58F-4C1E-93BD-4108C32E1751}">
       <dsp:nvSpPr>
         <dsp:cNvPr id="0" name=""/>
         <dsp:cNvSpPr/>
       </dsp:nvSpPr>
       <dsp:spPr>
         <a:xfrm>
-          <a:off x="2616249" y="3598167"/>
-          <a:ext cx="1151334" cy="719583"/>
+          <a:off x="2648842" y="3327337"/>
+          <a:ext cx="1064418" cy="665261"/>
         </a:xfrm>
         <a:prstGeom prst="roundRect">
           <a:avLst>
@@ -2885,12 +2938,12 @@
         <a:fontRef idx="minor"/>
       </dsp:style>
       <dsp:txBody>
-        <a:bodyPr spcFirstLastPara="0" vert="horz" wrap="square" lIns="28575" tIns="19050" rIns="28575" bIns="19050" numCol="1" spcCol="1270" anchor="ctr" anchorCtr="0">
+        <a:bodyPr spcFirstLastPara="0" vert="horz" wrap="square" lIns="20955" tIns="13970" rIns="20955" bIns="13970" numCol="1" spcCol="1270" anchor="ctr" anchorCtr="0">
           <a:noAutofit/>
         </a:bodyPr>
         <a:lstStyle/>
         <a:p>
-          <a:pPr marL="0" lvl="0" indent="0" algn="ctr" defTabSz="666750">
+          <a:pPr marL="0" lvl="0" indent="0" algn="ctr" defTabSz="488950">
             <a:lnSpc>
               <a:spcPct val="90000"/>
             </a:lnSpc>
@@ -2903,14 +2956,150 @@
             <a:buNone/>
           </a:pPr>
           <a:r>
-            <a:rPr lang="en-US" sz="1500" kern="1200" dirty="0"/>
+            <a:rPr lang="en-US" sz="1100" kern="1200" dirty="0"/>
+            <a:t>Computing with Higher-Order Functions</a:t>
+          </a:r>
+        </a:p>
+      </dsp:txBody>
+      <dsp:txXfrm>
+        <a:off x="2668327" y="3346822"/>
+        <a:ext cx="1025448" cy="626291"/>
+      </dsp:txXfrm>
+    </dsp:sp>
+    <dsp:sp modelId="{0ECF28DA-9925-4B5B-97B1-BDA459502114}">
+      <dsp:nvSpPr>
+        <dsp:cNvPr id="0" name=""/>
+        <dsp:cNvSpPr/>
+      </dsp:nvSpPr>
+      <dsp:spPr>
+        <a:xfrm>
+          <a:off x="2515790" y="666290"/>
+          <a:ext cx="191595" cy="3826284"/>
+        </a:xfrm>
+        <a:custGeom>
+          <a:avLst/>
+          <a:gdLst/>
+          <a:ahLst/>
+          <a:cxnLst/>
+          <a:rect l="0" t="0" r="0" b="0"/>
+          <a:pathLst>
+            <a:path>
+              <a:moveTo>
+                <a:pt x="0" y="0"/>
+              </a:moveTo>
+              <a:lnTo>
+                <a:pt x="0" y="3826284"/>
+              </a:lnTo>
+              <a:lnTo>
+                <a:pt x="191595" y="3826284"/>
+              </a:lnTo>
+            </a:path>
+          </a:pathLst>
+        </a:custGeom>
+        <a:noFill/>
+        <a:ln w="25400" cap="flat" cmpd="sng" algn="ctr">
+          <a:solidFill>
+            <a:schemeClr val="accent1">
+              <a:shade val="60000"/>
+              <a:hueOff val="0"/>
+              <a:satOff val="0"/>
+              <a:lumOff val="0"/>
+              <a:alphaOff val="0"/>
+            </a:schemeClr>
+          </a:solidFill>
+          <a:prstDash val="solid"/>
+        </a:ln>
+        <a:effectLst/>
+      </dsp:spPr>
+      <dsp:style>
+        <a:lnRef idx="2">
+          <a:scrgbClr r="0" g="0" b="0"/>
+        </a:lnRef>
+        <a:fillRef idx="0">
+          <a:scrgbClr r="0" g="0" b="0"/>
+        </a:fillRef>
+        <a:effectRef idx="0">
+          <a:scrgbClr r="0" g="0" b="0"/>
+        </a:effectRef>
+        <a:fontRef idx="minor"/>
+      </dsp:style>
+    </dsp:sp>
+    <dsp:sp modelId="{5A2BB121-DDEE-46A8-AC09-18496F773E62}">
+      <dsp:nvSpPr>
+        <dsp:cNvPr id="0" name=""/>
+        <dsp:cNvSpPr/>
+      </dsp:nvSpPr>
+      <dsp:spPr>
+        <a:xfrm>
+          <a:off x="2707386" y="4159944"/>
+          <a:ext cx="1064418" cy="665261"/>
+        </a:xfrm>
+        <a:prstGeom prst="roundRect">
+          <a:avLst>
+            <a:gd name="adj" fmla="val 10000"/>
+          </a:avLst>
+        </a:prstGeom>
+        <a:solidFill>
+          <a:schemeClr val="lt1">
+            <a:alpha val="90000"/>
+            <a:hueOff val="0"/>
+            <a:satOff val="0"/>
+            <a:lumOff val="0"/>
+            <a:alphaOff val="0"/>
+          </a:schemeClr>
+        </a:solidFill>
+        <a:ln w="25400" cap="flat" cmpd="sng" algn="ctr">
+          <a:solidFill>
+            <a:schemeClr val="accent1">
+              <a:hueOff val="0"/>
+              <a:satOff val="0"/>
+              <a:lumOff val="0"/>
+              <a:alphaOff val="0"/>
+            </a:schemeClr>
+          </a:solidFill>
+          <a:prstDash val="solid"/>
+        </a:ln>
+        <a:effectLst/>
+      </dsp:spPr>
+      <dsp:style>
+        <a:lnRef idx="2">
+          <a:scrgbClr r="0" g="0" b="0"/>
+        </a:lnRef>
+        <a:fillRef idx="1">
+          <a:scrgbClr r="0" g="0" b="0"/>
+        </a:fillRef>
+        <a:effectRef idx="0">
+          <a:scrgbClr r="0" g="0" b="0"/>
+        </a:effectRef>
+        <a:fontRef idx="minor"/>
+      </dsp:style>
+      <dsp:txBody>
+        <a:bodyPr spcFirstLastPara="0" vert="horz" wrap="square" lIns="20955" tIns="13970" rIns="20955" bIns="13970" numCol="1" spcCol="1270" anchor="ctr" anchorCtr="0">
+          <a:noAutofit/>
+        </a:bodyPr>
+        <a:lstStyle/>
+        <a:p>
+          <a:pPr marL="0" lvl="0" indent="0" algn="ctr" defTabSz="488950">
+            <a:lnSpc>
+              <a:spcPct val="90000"/>
+            </a:lnSpc>
+            <a:spcBef>
+              <a:spcPct val="0"/>
+            </a:spcBef>
+            <a:spcAft>
+              <a:spcPct val="35000"/>
+            </a:spcAft>
+            <a:buNone/>
+          </a:pPr>
+          <a:r>
+            <a:rPr lang="en-US" sz="1100" kern="1200" dirty="0"/>
             <a:t>Thinking about Efficiency</a:t>
           </a:r>
         </a:p>
       </dsp:txBody>
       <dsp:txXfrm>
-        <a:off x="2637325" y="3619243"/>
-        <a:ext cx="1109182" cy="677431"/>
+        <a:off x="2726871" y="4179429"/>
+        <a:ext cx="1025448" cy="626291"/>
       </dsp:txXfrm>
     </dsp:sp>
     <dsp:sp modelId="{3DB7ADFA-DCAB-4034-9F43-B860EBE864E8}">
@@ -2920,8 +3109,8 @@
       </dsp:nvSpPr>
       <dsp:spPr>
         <a:xfrm>
-          <a:off x="4127375" y="248"/>
-          <a:ext cx="1439167" cy="719583"/>
+          <a:off x="4045892" y="1029"/>
+          <a:ext cx="1330523" cy="665261"/>
         </a:xfrm>
         <a:prstGeom prst="roundRect">
           <a:avLst>
@@ -2964,12 +3153,12 @@
         </a:fontRef>
       </dsp:style>
       <dsp:txBody>
-        <a:bodyPr spcFirstLastPara="0" vert="horz" wrap="square" lIns="28575" tIns="19050" rIns="28575" bIns="19050" numCol="1" spcCol="1270" anchor="ctr" anchorCtr="0">
+        <a:bodyPr spcFirstLastPara="0" vert="horz" wrap="square" lIns="26670" tIns="17780" rIns="26670" bIns="17780" numCol="1" spcCol="1270" anchor="ctr" anchorCtr="0">
           <a:noAutofit/>
         </a:bodyPr>
         <a:lstStyle/>
         <a:p>
-          <a:pPr marL="0" lvl="0" indent="0" algn="ctr" defTabSz="666750">
+          <a:pPr marL="0" lvl="0" indent="0" algn="ctr" defTabSz="622300">
             <a:lnSpc>
               <a:spcPct val="90000"/>
             </a:lnSpc>
@@ -2982,14 +3171,14 @@
             <a:buNone/>
           </a:pPr>
           <a:r>
-            <a:rPr lang="en-US" sz="1500" kern="1200" dirty="0"/>
+            <a:rPr lang="en-US" sz="1400" kern="1200" dirty="0"/>
             <a:t>Object-Oriented Programming</a:t>
           </a:r>
         </a:p>
       </dsp:txBody>
       <dsp:txXfrm>
-        <a:off x="4148451" y="21324"/>
-        <a:ext cx="1397015" cy="677431"/>
+        <a:off x="4065377" y="20514"/>
+        <a:ext cx="1291553" cy="626291"/>
       </dsp:txXfrm>
     </dsp:sp>
     <dsp:sp modelId="{278D3975-9588-4A95-85BD-D062BB0AE1A4}">
@@ -2999,8 +3188,8 @@
       </dsp:nvSpPr>
       <dsp:spPr>
         <a:xfrm>
-          <a:off x="4271292" y="719832"/>
-          <a:ext cx="143916" cy="539687"/>
+          <a:off x="4178944" y="666290"/>
+          <a:ext cx="133052" cy="498946"/>
         </a:xfrm>
         <a:custGeom>
           <a:avLst/>
@@ -3014,10 +3203,10 @@
                 <a:pt x="0" y="0"/>
               </a:moveTo>
               <a:lnTo>
-                <a:pt x="0" y="539687"/>
+                <a:pt x="0" y="498946"/>
               </a:lnTo>
               <a:lnTo>
-                <a:pt x="143916" y="539687"/>
+                <a:pt x="133052" y="498946"/>
               </a:lnTo>
             </a:path>
           </a:pathLst>
@@ -3057,8 +3246,8 @@
       </dsp:nvSpPr>
       <dsp:spPr>
         <a:xfrm>
-          <a:off x="4415209" y="899728"/>
-          <a:ext cx="1151334" cy="719583"/>
+          <a:off x="4311997" y="832606"/>
+          <a:ext cx="1064418" cy="665261"/>
         </a:xfrm>
         <a:prstGeom prst="roundRect">
           <a:avLst>
@@ -3100,12 +3289,12 @@
         <a:fontRef idx="minor"/>
       </dsp:style>
       <dsp:txBody>
-        <a:bodyPr spcFirstLastPara="0" vert="horz" wrap="square" lIns="28575" tIns="19050" rIns="28575" bIns="19050" numCol="1" spcCol="1270" anchor="ctr" anchorCtr="0">
+        <a:bodyPr spcFirstLastPara="0" vert="horz" wrap="square" lIns="20955" tIns="13970" rIns="20955" bIns="13970" numCol="1" spcCol="1270" anchor="ctr" anchorCtr="0">
           <a:noAutofit/>
         </a:bodyPr>
         <a:lstStyle/>
         <a:p>
-          <a:pPr marL="0" lvl="0" indent="0" algn="ctr" defTabSz="666750">
+          <a:pPr marL="0" lvl="0" indent="0" algn="ctr" defTabSz="488950">
             <a:lnSpc>
               <a:spcPct val="90000"/>
             </a:lnSpc>
@@ -3118,14 +3307,14 @@
             <a:buNone/>
           </a:pPr>
           <a:r>
-            <a:rPr lang="en-US" sz="1500" kern="1200" dirty="0"/>
+            <a:rPr lang="en-US" sz="1100" kern="1200" dirty="0"/>
             <a:t>Interfaces and Classes</a:t>
           </a:r>
         </a:p>
       </dsp:txBody>
       <dsp:txXfrm>
-        <a:off x="4436285" y="920804"/>
-        <a:ext cx="1109182" cy="677431"/>
+        <a:off x="4331482" y="852091"/>
+        <a:ext cx="1025448" cy="626291"/>
       </dsp:txXfrm>
     </dsp:sp>
     <dsp:sp modelId="{FF100697-267A-4BC5-8DA9-B1F7321DFE84}">
@@ -3135,8 +3324,8 @@
       </dsp:nvSpPr>
       <dsp:spPr>
         <a:xfrm>
-          <a:off x="4271292" y="719832"/>
-          <a:ext cx="143916" cy="1439167"/>
+          <a:off x="4178944" y="666290"/>
+          <a:ext cx="133052" cy="1330523"/>
         </a:xfrm>
         <a:custGeom>
           <a:avLst/>
@@ -3150,10 +3339,10 @@
                 <a:pt x="0" y="0"/>
               </a:moveTo>
               <a:lnTo>
-                <a:pt x="0" y="1439167"/>
+                <a:pt x="0" y="1330523"/>
               </a:lnTo>
               <a:lnTo>
-                <a:pt x="143916" y="1439167"/>
+                <a:pt x="133052" y="1330523"/>
               </a:lnTo>
             </a:path>
           </a:pathLst>
@@ -3193,8 +3382,8 @@
       </dsp:nvSpPr>
       <dsp:spPr>
         <a:xfrm>
-          <a:off x="4415209" y="1799208"/>
-          <a:ext cx="1151334" cy="719583"/>
+          <a:off x="4311997" y="1664183"/>
+          <a:ext cx="1064418" cy="665261"/>
         </a:xfrm>
         <a:prstGeom prst="roundRect">
           <a:avLst>
@@ -3236,12 +3425,12 @@
         <a:fontRef idx="minor"/>
       </dsp:style>
       <dsp:txBody>
-        <a:bodyPr spcFirstLastPara="0" vert="horz" wrap="square" lIns="28575" tIns="19050" rIns="28575" bIns="19050" numCol="1" spcCol="1270" anchor="ctr" anchorCtr="0">
+        <a:bodyPr spcFirstLastPara="0" vert="horz" wrap="square" lIns="20955" tIns="13970" rIns="20955" bIns="13970" numCol="1" spcCol="1270" anchor="ctr" anchorCtr="0">
           <a:noAutofit/>
         </a:bodyPr>
         <a:lstStyle/>
         <a:p>
-          <a:pPr marL="0" lvl="0" indent="0" algn="ctr" defTabSz="666750">
+          <a:pPr marL="0" lvl="0" indent="0" algn="ctr" defTabSz="488950">
             <a:lnSpc>
               <a:spcPct val="90000"/>
             </a:lnSpc>
@@ -3254,14 +3443,14 @@
             <a:buNone/>
           </a:pPr>
           <a:r>
-            <a:rPr lang="en-US" sz="1500" kern="1200" dirty="0"/>
+            <a:rPr lang="en-US" sz="1100" kern="1200" dirty="0"/>
             <a:t>Inheritance</a:t>
           </a:r>
         </a:p>
       </dsp:txBody>
       <dsp:txXfrm>
-        <a:off x="4436285" y="1820284"/>
-        <a:ext cx="1109182" cy="677431"/>
+        <a:off x="4331482" y="1683668"/>
+        <a:ext cx="1025448" cy="626291"/>
       </dsp:txXfrm>
     </dsp:sp>
     <dsp:sp modelId="{6B27DFF3-3021-4E99-BF73-829A6255425D}">
@@ -3271,8 +3460,8 @@
       </dsp:nvSpPr>
       <dsp:spPr>
         <a:xfrm>
-          <a:off x="4271292" y="719832"/>
-          <a:ext cx="143916" cy="2338647"/>
+          <a:off x="4178944" y="666290"/>
+          <a:ext cx="133052" cy="2162100"/>
         </a:xfrm>
         <a:custGeom>
           <a:avLst/>
@@ -3286,10 +3475,10 @@
                 <a:pt x="0" y="0"/>
               </a:moveTo>
               <a:lnTo>
-                <a:pt x="0" y="2338647"/>
+                <a:pt x="0" y="2162100"/>
               </a:lnTo>
               <a:lnTo>
-                <a:pt x="143916" y="2338647"/>
+                <a:pt x="133052" y="2162100"/>
               </a:lnTo>
             </a:path>
           </a:pathLst>
@@ -3329,8 +3518,8 @@
       </dsp:nvSpPr>
       <dsp:spPr>
         <a:xfrm>
-          <a:off x="4415209" y="2698687"/>
-          <a:ext cx="1151334" cy="719583"/>
+          <a:off x="4311997" y="2495760"/>
+          <a:ext cx="1064418" cy="665261"/>
         </a:xfrm>
         <a:prstGeom prst="roundRect">
           <a:avLst>
@@ -3372,12 +3561,12 @@
         <a:fontRef idx="minor"/>
       </dsp:style>
       <dsp:txBody>
-        <a:bodyPr spcFirstLastPara="0" vert="horz" wrap="square" lIns="28575" tIns="19050" rIns="28575" bIns="19050" numCol="1" spcCol="1270" anchor="ctr" anchorCtr="0">
+        <a:bodyPr spcFirstLastPara="0" vert="horz" wrap="square" lIns="20955" tIns="13970" rIns="20955" bIns="13970" numCol="1" spcCol="1270" anchor="ctr" anchorCtr="0">
           <a:noAutofit/>
         </a:bodyPr>
         <a:lstStyle/>
         <a:p>
-          <a:pPr marL="0" lvl="0" indent="0" algn="ctr" defTabSz="666750">
+          <a:pPr marL="0" lvl="0" indent="0" algn="ctr" defTabSz="488950">
             <a:lnSpc>
               <a:spcPct val="90000"/>
             </a:lnSpc>
@@ -3390,14 +3579,14 @@
             <a:buNone/>
           </a:pPr>
           <a:r>
-            <a:rPr lang="en-US" sz="1500" kern="1200" dirty="0"/>
+            <a:rPr lang="en-US" sz="1100" kern="1200" dirty="0"/>
             <a:t>Objects with Mutable State</a:t>
           </a:r>
         </a:p>
       </dsp:txBody>
       <dsp:txXfrm>
-        <a:off x="4436285" y="2719763"/>
-        <a:ext cx="1109182" cy="677431"/>
+        <a:off x="4331482" y="2515245"/>
+        <a:ext cx="1025448" cy="626291"/>
       </dsp:txXfrm>
     </dsp:sp>
     <dsp:sp modelId="{E8A2D34D-9B35-4804-BD08-DC4453907292}">
@@ -3407,8 +3596,8 @@
       </dsp:nvSpPr>
       <dsp:spPr>
         <a:xfrm>
-          <a:off x="4271292" y="719832"/>
-          <a:ext cx="143916" cy="3238127"/>
+          <a:off x="4178944" y="666290"/>
+          <a:ext cx="133052" cy="2993677"/>
         </a:xfrm>
         <a:custGeom>
           <a:avLst/>
@@ -3422,10 +3611,10 @@
                 <a:pt x="0" y="0"/>
               </a:moveTo>
               <a:lnTo>
-                <a:pt x="0" y="3238127"/>
+                <a:pt x="0" y="2993677"/>
               </a:lnTo>
               <a:lnTo>
-                <a:pt x="143916" y="3238127"/>
+                <a:pt x="133052" y="2993677"/>
               </a:lnTo>
             </a:path>
           </a:pathLst>
@@ -3465,8 +3654,8 @@
       </dsp:nvSpPr>
       <dsp:spPr>
         <a:xfrm>
-          <a:off x="4415209" y="3598167"/>
-          <a:ext cx="1151334" cy="719583"/>
+          <a:off x="4311997" y="3327337"/>
+          <a:ext cx="1064418" cy="665261"/>
         </a:xfrm>
         <a:prstGeom prst="roundRect">
           <a:avLst>
@@ -3508,12 +3697,12 @@
         <a:fontRef idx="minor"/>
       </dsp:style>
       <dsp:txBody>
-        <a:bodyPr spcFirstLastPara="0" vert="horz" wrap="square" lIns="28575" tIns="19050" rIns="28575" bIns="19050" numCol="1" spcCol="1270" anchor="ctr" anchorCtr="0">
+        <a:bodyPr spcFirstLastPara="0" vert="horz" wrap="square" lIns="20955" tIns="13970" rIns="20955" bIns="13970" numCol="1" spcCol="1270" anchor="ctr" anchorCtr="0">
           <a:noAutofit/>
         </a:bodyPr>
         <a:lstStyle/>
         <a:p>
-          <a:pPr marL="0" lvl="0" indent="0" algn="ctr" defTabSz="666750">
+          <a:pPr marL="0" lvl="0" indent="0" algn="ctr" defTabSz="488950">
             <a:lnSpc>
               <a:spcPct val="90000"/>
             </a:lnSpc>
@@ -3526,14 +3715,14 @@
             <a:buNone/>
           </a:pPr>
           <a:r>
-            <a:rPr lang="en-US" sz="1500" kern="1200" dirty="0"/>
+            <a:rPr lang="en-US" sz="1100" kern="1200" dirty="0"/>
             <a:t>Efficiency, Part 2</a:t>
           </a:r>
         </a:p>
       </dsp:txBody>
       <dsp:txXfrm>
-        <a:off x="4436285" y="3619243"/>
-        <a:ext cx="1109182" cy="677431"/>
+        <a:off x="4331482" y="3346822"/>
+        <a:ext cx="1025448" cy="626291"/>
       </dsp:txXfrm>
     </dsp:sp>
   </dsp:spTree>
@@ -4949,7 +5138,7 @@
             <a:fld id="{F428509D-A83E-4130-9123-C9B4F5E9EE37}" type="datetimeFigureOut">
               <a:rPr lang="en-US" smtClean="0"/>
               <a:pPr/>
-              <a:t>8/11/2017</a:t>
+              <a:t>8/28/2017</a:t>
             </a:fld>
             <a:endParaRPr lang="en-US"/>
           </a:p>
@@ -5116,7 +5305,7 @@
             <a:fld id="{ACC16E80-119B-43B5-8043-B652C91D44CD}" type="datetimeFigureOut">
               <a:rPr lang="en-US" smtClean="0"/>
               <a:pPr/>
-              <a:t>8/11/2017</a:t>
+              <a:t>8/28/2017</a:t>
             </a:fld>
             <a:endParaRPr lang="en-US"/>
           </a:p>
@@ -5544,7 +5733,7 @@
             <a:fld id="{6048B3DE-E9CD-4720-84B6-E24D30E64DE7}" type="slidenum">
               <a:rPr lang="en-US" smtClean="0"/>
               <a:pPr/>
-              <a:t>18</a:t>
+              <a:t>17</a:t>
             </a:fld>
             <a:endParaRPr lang="en-US"/>
           </a:p>
@@ -5553,7 +5742,7 @@
     </p:spTree>
     <p:extLst>
       <p:ext uri="{BB962C8B-B14F-4D97-AF65-F5344CB8AC3E}">
-        <p14:creationId xmlns:p14="http://schemas.microsoft.com/office/powerpoint/2010/main" val="941025782"/>
+        <p14:creationId xmlns:p14="http://schemas.microsoft.com/office/powerpoint/2010/main" val="346815828"/>
       </p:ext>
     </p:extLst>
   </p:cSld>
@@ -5631,7 +5820,7 @@
             <a:fld id="{6048B3DE-E9CD-4720-84B6-E24D30E64DE7}" type="slidenum">
               <a:rPr lang="en-US" smtClean="0"/>
               <a:pPr/>
-              <a:t>20</a:t>
+              <a:t>18</a:t>
             </a:fld>
             <a:endParaRPr lang="en-US"/>
           </a:p>
@@ -5640,7 +5829,7 @@
     </p:spTree>
     <p:extLst>
       <p:ext uri="{BB962C8B-B14F-4D97-AF65-F5344CB8AC3E}">
-        <p14:creationId xmlns:p14="http://schemas.microsoft.com/office/powerpoint/2010/main" val="4008479041"/>
+        <p14:creationId xmlns:p14="http://schemas.microsoft.com/office/powerpoint/2010/main" val="941025782"/>
       </p:ext>
     </p:extLst>
   </p:cSld>
@@ -5718,7 +5907,7 @@
             <a:fld id="{6048B3DE-E9CD-4720-84B6-E24D30E64DE7}" type="slidenum">
               <a:rPr lang="en-US" smtClean="0"/>
               <a:pPr/>
-              <a:t>21</a:t>
+              <a:t>20</a:t>
             </a:fld>
             <a:endParaRPr lang="en-US"/>
           </a:p>
@@ -5727,7 +5916,7 @@
     </p:spTree>
     <p:extLst>
       <p:ext uri="{BB962C8B-B14F-4D97-AF65-F5344CB8AC3E}">
-        <p14:creationId xmlns:p14="http://schemas.microsoft.com/office/powerpoint/2010/main" val="381589088"/>
+        <p14:creationId xmlns:p14="http://schemas.microsoft.com/office/powerpoint/2010/main" val="4008479041"/>
       </p:ext>
     </p:extLst>
   </p:cSld>
@@ -5805,7 +5994,7 @@
             <a:fld id="{6048B3DE-E9CD-4720-84B6-E24D30E64DE7}" type="slidenum">
               <a:rPr lang="en-US" smtClean="0"/>
               <a:pPr/>
-              <a:t>22</a:t>
+              <a:t>21</a:t>
             </a:fld>
             <a:endParaRPr lang="en-US"/>
           </a:p>
@@ -5814,7 +6003,7 @@
     </p:spTree>
     <p:extLst>
       <p:ext uri="{BB962C8B-B14F-4D97-AF65-F5344CB8AC3E}">
-        <p14:creationId xmlns:p14="http://schemas.microsoft.com/office/powerpoint/2010/main" val="1648538829"/>
+        <p14:creationId xmlns:p14="http://schemas.microsoft.com/office/powerpoint/2010/main" val="381589088"/>
       </p:ext>
     </p:extLst>
   </p:cSld>
@@ -5892,7 +6081,7 @@
             <a:fld id="{6048B3DE-E9CD-4720-84B6-E24D30E64DE7}" type="slidenum">
               <a:rPr lang="en-US" smtClean="0"/>
               <a:pPr/>
-              <a:t>23</a:t>
+              <a:t>22</a:t>
             </a:fld>
             <a:endParaRPr lang="en-US"/>
           </a:p>
@@ -5901,7 +6090,7 @@
     </p:spTree>
     <p:extLst>
       <p:ext uri="{BB962C8B-B14F-4D97-AF65-F5344CB8AC3E}">
-        <p14:creationId xmlns:p14="http://schemas.microsoft.com/office/powerpoint/2010/main" val="3557699205"/>
+        <p14:creationId xmlns:p14="http://schemas.microsoft.com/office/powerpoint/2010/main" val="1648538829"/>
       </p:ext>
     </p:extLst>
   </p:cSld>
@@ -5979,6 +6168,93 @@
             <a:fld id="{6048B3DE-E9CD-4720-84B6-E24D30E64DE7}" type="slidenum">
               <a:rPr lang="en-US" smtClean="0"/>
               <a:pPr/>
+              <a:t>23</a:t>
+            </a:fld>
+            <a:endParaRPr lang="en-US"/>
+          </a:p>
+        </p:txBody>
+      </p:sp>
+    </p:spTree>
+    <p:extLst>
+      <p:ext uri="{BB962C8B-B14F-4D97-AF65-F5344CB8AC3E}">
+        <p14:creationId xmlns:p14="http://schemas.microsoft.com/office/powerpoint/2010/main" val="3557699205"/>
+      </p:ext>
+    </p:extLst>
+  </p:cSld>
+  <p:clrMapOvr>
+    <a:masterClrMapping/>
+  </p:clrMapOvr>
+</p:notes>
+</file>
+
+<file path=ppt/notesSlides/notesSlide16.xml><?xml version="1.0" encoding="utf-8"?>
+<p:notes xmlns:a="http://schemas.openxmlformats.org/drawingml/2006/main" xmlns:r="http://schemas.openxmlformats.org/officeDocument/2006/relationships" xmlns:p="http://schemas.openxmlformats.org/presentationml/2006/main">
+  <p:cSld>
+    <p:spTree>
+      <p:nvGrpSpPr>
+        <p:cNvPr id="1" name=""/>
+        <p:cNvGrpSpPr/>
+        <p:nvPr/>
+      </p:nvGrpSpPr>
+      <p:grpSpPr>
+        <a:xfrm>
+          <a:off x="0" y="0"/>
+          <a:ext cx="0" cy="0"/>
+          <a:chOff x="0" y="0"/>
+          <a:chExt cx="0" cy="0"/>
+        </a:xfrm>
+      </p:grpSpPr>
+      <p:sp>
+        <p:nvSpPr>
+          <p:cNvPr id="2" name="Slide Image Placeholder 1"/>
+          <p:cNvSpPr>
+            <a:spLocks noGrp="1" noRot="1" noChangeAspect="1"/>
+          </p:cNvSpPr>
+          <p:nvPr>
+            <p:ph type="sldImg"/>
+          </p:nvPr>
+        </p:nvSpPr>
+        <p:spPr/>
+      </p:sp>
+      <p:sp>
+        <p:nvSpPr>
+          <p:cNvPr id="3" name="Notes Placeholder 2"/>
+          <p:cNvSpPr>
+            <a:spLocks noGrp="1"/>
+          </p:cNvSpPr>
+          <p:nvPr>
+            <p:ph type="body" idx="1"/>
+          </p:nvPr>
+        </p:nvSpPr>
+        <p:spPr/>
+        <p:txBody>
+          <a:bodyPr>
+            <a:normAutofit/>
+          </a:bodyPr>
+          <a:lstStyle/>
+          <a:p>
+            <a:endParaRPr lang="en-US" dirty="0"/>
+          </a:p>
+        </p:txBody>
+      </p:sp>
+      <p:sp>
+        <p:nvSpPr>
+          <p:cNvPr id="4" name="Slide Number Placeholder 3"/>
+          <p:cNvSpPr>
+            <a:spLocks noGrp="1"/>
+          </p:cNvSpPr>
+          <p:nvPr>
+            <p:ph type="sldNum" sz="quarter" idx="10"/>
+          </p:nvPr>
+        </p:nvSpPr>
+        <p:spPr/>
+        <p:txBody>
+          <a:bodyPr/>
+          <a:lstStyle/>
+          <a:p>
+            <a:fld id="{6048B3DE-E9CD-4720-84B6-E24D30E64DE7}" type="slidenum">
+              <a:rPr lang="en-US" smtClean="0"/>
+              <a:pPr/>
               <a:t>24</a:t>
             </a:fld>
             <a:endParaRPr lang="en-US"/>
@@ -5998,7 +6274,7 @@
 </p:notes>
 </file>
 
-<file path=ppt/notesSlides/notesSlide16.xml><?xml version="1.0" encoding="utf-8"?>
+<file path=ppt/notesSlides/notesSlide17.xml><?xml version="1.0" encoding="utf-8"?>
 <p:notes xmlns:a="http://schemas.openxmlformats.org/drawingml/2006/main" xmlns:r="http://schemas.openxmlformats.org/officeDocument/2006/relationships" xmlns:p="http://schemas.openxmlformats.org/presentationml/2006/main">
   <p:cSld>
     <p:spTree>
@@ -6129,10 +6405,7 @@
           <a:bodyPr/>
           <a:lstStyle/>
           <a:p>
-            <a:r>
-              <a:rPr lang="en-US" dirty="0"/>
-              <a:t>Here is the function design recipe.  </a:t>
-            </a:r>
+            <a:endParaRPr lang="en-US" dirty="0"/>
           </a:p>
         </p:txBody>
       </p:sp>
@@ -6154,7 +6427,7 @@
             <a:fld id="{6048B3DE-E9CD-4720-84B6-E24D30E64DE7}" type="slidenum">
               <a:rPr lang="en-US" smtClean="0"/>
               <a:pPr/>
-              <a:t>5</a:t>
+              <a:t>2</a:t>
             </a:fld>
             <a:endParaRPr lang="en-US"/>
           </a:p>
@@ -6163,7 +6436,7 @@
     </p:spTree>
     <p:extLst>
       <p:ext uri="{BB962C8B-B14F-4D97-AF65-F5344CB8AC3E}">
-        <p14:creationId xmlns:p14="http://schemas.microsoft.com/office/powerpoint/2010/main" val="3683848936"/>
+        <p14:creationId xmlns:p14="http://schemas.microsoft.com/office/powerpoint/2010/main" val="2252890871"/>
       </p:ext>
     </p:extLst>
   </p:cSld>
@@ -6214,71 +6487,12 @@
         </p:nvSpPr>
         <p:spPr/>
         <p:txBody>
-          <a:bodyPr>
-            <a:normAutofit/>
-          </a:bodyPr>
+          <a:bodyPr/>
           <a:lstStyle/>
           <a:p>
             <a:r>
               <a:rPr lang="en-US" dirty="0"/>
-              <a:t>The first step is Information Analysis and Data Design.</a:t>
-            </a:r>
-          </a:p>
-          <a:p>
-            <a:endParaRPr lang="en-US" dirty="0"/>
-          </a:p>
-          <a:p>
-            <a:pPr marL="0" marR="0" indent="0" algn="l" defTabSz="914400" rtl="0" eaLnBrk="1" fontAlgn="auto" latinLnBrk="0" hangingPunct="1">
-              <a:lnSpc>
-                <a:spcPct val="100000"/>
-              </a:lnSpc>
-              <a:spcBef>
-                <a:spcPts val="0"/>
-              </a:spcBef>
-              <a:spcAft>
-                <a:spcPts val="0"/>
-              </a:spcAft>
-              <a:buClrTx/>
-              <a:buSzTx/>
-              <a:buFontTx/>
-              <a:buNone/>
-              <a:tabLst/>
-              <a:defRPr/>
-            </a:pPr>
-            <a:r>
-              <a:rPr lang="en-US" dirty="0"/>
-              <a:t>To understand</a:t>
-            </a:r>
-            <a:r>
-              <a:rPr lang="en-US" baseline="0" dirty="0"/>
-              <a:t> this step, we need to understand the difference between information and data.  In this course, we use the word “information” to mean information about the real world. We use the word “data” to mean the way that information is represented in my computer program.</a:t>
-            </a:r>
-          </a:p>
-          <a:p>
-            <a:endParaRPr lang="en-US" baseline="0" dirty="0"/>
-          </a:p>
-          <a:p>
-            <a:r>
-              <a:rPr lang="en-US" baseline="0" dirty="0"/>
-              <a:t>For example, right now I am wearing a red shirt.  That’s information.  I can represent that information by a string, say “rouge”.  That’s data.  (I chose “rouge” rather than “red” because my customer is French!).</a:t>
-            </a:r>
-          </a:p>
-          <a:p>
-            <a:endParaRPr lang="en-US" baseline="0" dirty="0"/>
-          </a:p>
-          <a:p>
-            <a:r>
-              <a:rPr lang="en-US" baseline="0" dirty="0"/>
-              <a:t>In any application, we need to decide what part of all the information in the world needs to be represented as data, and exactly how it will be represented. </a:t>
-            </a:r>
-          </a:p>
-          <a:p>
-            <a:endParaRPr lang="en-US" baseline="0" dirty="0"/>
-          </a:p>
-          <a:p>
-            <a:r>
-              <a:rPr lang="en-US" baseline="0" dirty="0"/>
-              <a:t>And we need to document that representation so that others can understand our program (remember, programs are meant to be read by people!)</a:t>
+              <a:t>Here is the function design recipe.  </a:t>
             </a:r>
           </a:p>
         </p:txBody>
@@ -6301,7 +6515,7 @@
             <a:fld id="{6048B3DE-E9CD-4720-84B6-E24D30E64DE7}" type="slidenum">
               <a:rPr lang="en-US" smtClean="0"/>
               <a:pPr/>
-              <a:t>9</a:t>
+              <a:t>5</a:t>
             </a:fld>
             <a:endParaRPr lang="en-US"/>
           </a:p>
@@ -6310,7 +6524,7 @@
     </p:spTree>
     <p:extLst>
       <p:ext uri="{BB962C8B-B14F-4D97-AF65-F5344CB8AC3E}">
-        <p14:creationId xmlns:p14="http://schemas.microsoft.com/office/powerpoint/2010/main" val="1254396233"/>
+        <p14:creationId xmlns:p14="http://schemas.microsoft.com/office/powerpoint/2010/main" val="3683848936"/>
       </p:ext>
     </p:extLst>
   </p:cSld>
@@ -6368,16 +6582,64 @@
           <a:p>
             <a:r>
               <a:rPr lang="en-US" dirty="0"/>
-              <a:t>Information is represented as Data</a:t>
+              <a:t>The first step is Information Analysis and Data Design.</a:t>
             </a:r>
           </a:p>
           <a:p>
             <a:endParaRPr lang="en-US" dirty="0"/>
           </a:p>
           <a:p>
+            <a:pPr marL="0" marR="0" indent="0" algn="l" defTabSz="914400" rtl="0" eaLnBrk="1" fontAlgn="auto" latinLnBrk="0" hangingPunct="1">
+              <a:lnSpc>
+                <a:spcPct val="100000"/>
+              </a:lnSpc>
+              <a:spcBef>
+                <a:spcPts val="0"/>
+              </a:spcBef>
+              <a:spcAft>
+                <a:spcPts val="0"/>
+              </a:spcAft>
+              <a:buClrTx/>
+              <a:buSzTx/>
+              <a:buFontTx/>
+              <a:buNone/>
+              <a:tabLst/>
+              <a:defRPr/>
+            </a:pPr>
             <a:r>
               <a:rPr lang="en-US" dirty="0"/>
-              <a:t>Data is interpreted as Information</a:t>
+              <a:t>To understand</a:t>
+            </a:r>
+            <a:r>
+              <a:rPr lang="en-US" baseline="0" dirty="0"/>
+              <a:t> this step, we need to understand the difference between information and data.  In this course, we use the word “information” to mean information about the real world. We use the word “data” to mean the way that information is represented in my computer program.</a:t>
+            </a:r>
+          </a:p>
+          <a:p>
+            <a:endParaRPr lang="en-US" baseline="0" dirty="0"/>
+          </a:p>
+          <a:p>
+            <a:r>
+              <a:rPr lang="en-US" baseline="0" dirty="0"/>
+              <a:t>For example, right now I am wearing a red shirt.  That’s information.  I can represent that information by a string, say “rouge”.  That’s data.  (I chose “rouge” rather than “red” because my customer is French!).</a:t>
+            </a:r>
+          </a:p>
+          <a:p>
+            <a:endParaRPr lang="en-US" baseline="0" dirty="0"/>
+          </a:p>
+          <a:p>
+            <a:r>
+              <a:rPr lang="en-US" baseline="0" dirty="0"/>
+              <a:t>In any application, we need to decide what part of all the information in the world needs to be represented as data, and exactly how it will be represented. </a:t>
+            </a:r>
+          </a:p>
+          <a:p>
+            <a:endParaRPr lang="en-US" baseline="0" dirty="0"/>
+          </a:p>
+          <a:p>
+            <a:r>
+              <a:rPr lang="en-US" baseline="0" dirty="0"/>
+              <a:t>And we need to document that representation so that others can understand our program (remember, programs are meant to be read by people!)</a:t>
             </a:r>
           </a:p>
         </p:txBody>
@@ -6400,7 +6662,7 @@
             <a:fld id="{6048B3DE-E9CD-4720-84B6-E24D30E64DE7}" type="slidenum">
               <a:rPr lang="en-US" smtClean="0"/>
               <a:pPr/>
-              <a:t>10</a:t>
+              <a:t>9</a:t>
             </a:fld>
             <a:endParaRPr lang="en-US"/>
           </a:p>
@@ -6409,7 +6671,7 @@
     </p:spTree>
     <p:extLst>
       <p:ext uri="{BB962C8B-B14F-4D97-AF65-F5344CB8AC3E}">
-        <p14:creationId xmlns:p14="http://schemas.microsoft.com/office/powerpoint/2010/main" val="2791385957"/>
+        <p14:creationId xmlns:p14="http://schemas.microsoft.com/office/powerpoint/2010/main" val="1254396233"/>
       </p:ext>
     </p:extLst>
   </p:cSld>
@@ -6499,7 +6761,7 @@
             <a:fld id="{6048B3DE-E9CD-4720-84B6-E24D30E64DE7}" type="slidenum">
               <a:rPr lang="en-US" smtClean="0"/>
               <a:pPr/>
-              <a:t>11</a:t>
+              <a:t>10</a:t>
             </a:fld>
             <a:endParaRPr lang="en-US"/>
           </a:p>
@@ -6508,7 +6770,7 @@
     </p:spTree>
     <p:extLst>
       <p:ext uri="{BB962C8B-B14F-4D97-AF65-F5344CB8AC3E}">
-        <p14:creationId xmlns:p14="http://schemas.microsoft.com/office/powerpoint/2010/main" val="2448797114"/>
+        <p14:creationId xmlns:p14="http://schemas.microsoft.com/office/powerpoint/2010/main" val="2791385957"/>
       </p:ext>
     </p:extLst>
   </p:cSld>
@@ -6598,7 +6860,7 @@
             <a:fld id="{6048B3DE-E9CD-4720-84B6-E24D30E64DE7}" type="slidenum">
               <a:rPr lang="en-US" smtClean="0"/>
               <a:pPr/>
-              <a:t>12</a:t>
+              <a:t>11</a:t>
             </a:fld>
             <a:endParaRPr lang="en-US"/>
           </a:p>
@@ -6607,7 +6869,7 @@
     </p:spTree>
     <p:extLst>
       <p:ext uri="{BB962C8B-B14F-4D97-AF65-F5344CB8AC3E}">
-        <p14:creationId xmlns:p14="http://schemas.microsoft.com/office/powerpoint/2010/main" val="3197104917"/>
+        <p14:creationId xmlns:p14="http://schemas.microsoft.com/office/powerpoint/2010/main" val="2448797114"/>
       </p:ext>
     </p:extLst>
   </p:cSld>
@@ -6663,7 +6925,19 @@
           </a:bodyPr>
           <a:lstStyle/>
           <a:p>
+            <a:r>
+              <a:rPr lang="en-US" dirty="0"/>
+              <a:t>Information is represented as Data</a:t>
+            </a:r>
+          </a:p>
+          <a:p>
             <a:endParaRPr lang="en-US" dirty="0"/>
+          </a:p>
+          <a:p>
+            <a:r>
+              <a:rPr lang="en-US" dirty="0"/>
+              <a:t>Data is interpreted as Information</a:t>
+            </a:r>
           </a:p>
         </p:txBody>
       </p:sp>
@@ -6685,7 +6959,7 @@
             <a:fld id="{6048B3DE-E9CD-4720-84B6-E24D30E64DE7}" type="slidenum">
               <a:rPr lang="en-US" smtClean="0"/>
               <a:pPr/>
-              <a:t>15</a:t>
+              <a:t>12</a:t>
             </a:fld>
             <a:endParaRPr lang="en-US"/>
           </a:p>
@@ -6694,7 +6968,7 @@
     </p:spTree>
     <p:extLst>
       <p:ext uri="{BB962C8B-B14F-4D97-AF65-F5344CB8AC3E}">
-        <p14:creationId xmlns:p14="http://schemas.microsoft.com/office/powerpoint/2010/main" val="2541650794"/>
+        <p14:creationId xmlns:p14="http://schemas.microsoft.com/office/powerpoint/2010/main" val="3197104917"/>
       </p:ext>
     </p:extLst>
   </p:cSld>
@@ -6772,7 +7046,7 @@
             <a:fld id="{6048B3DE-E9CD-4720-84B6-E24D30E64DE7}" type="slidenum">
               <a:rPr lang="en-US" smtClean="0"/>
               <a:pPr/>
-              <a:t>16</a:t>
+              <a:t>15</a:t>
             </a:fld>
             <a:endParaRPr lang="en-US"/>
           </a:p>
@@ -6781,7 +7055,7 @@
     </p:spTree>
     <p:extLst>
       <p:ext uri="{BB962C8B-B14F-4D97-AF65-F5344CB8AC3E}">
-        <p14:creationId xmlns:p14="http://schemas.microsoft.com/office/powerpoint/2010/main" val="3076487710"/>
+        <p14:creationId xmlns:p14="http://schemas.microsoft.com/office/powerpoint/2010/main" val="2541650794"/>
       </p:ext>
     </p:extLst>
   </p:cSld>
@@ -6859,7 +7133,7 @@
             <a:fld id="{6048B3DE-E9CD-4720-84B6-E24D30E64DE7}" type="slidenum">
               <a:rPr lang="en-US" smtClean="0"/>
               <a:pPr/>
-              <a:t>17</a:t>
+              <a:t>16</a:t>
             </a:fld>
             <a:endParaRPr lang="en-US"/>
           </a:p>
@@ -6868,7 +7142,7 @@
     </p:spTree>
     <p:extLst>
       <p:ext uri="{BB962C8B-B14F-4D97-AF65-F5344CB8AC3E}">
-        <p14:creationId xmlns:p14="http://schemas.microsoft.com/office/powerpoint/2010/main" val="346815828"/>
+        <p14:creationId xmlns:p14="http://schemas.microsoft.com/office/powerpoint/2010/main" val="3076487710"/>
       </p:ext>
     </p:extLst>
   </p:cSld>
@@ -7058,7 +7332,7 @@
             <a:fld id="{995A3EAA-2ADF-4730-8F37-D322F0FCA6F7}" type="datetime1">
               <a:rPr lang="en-US" smtClean="0"/>
               <a:pPr/>
-              <a:t>8/11/2017</a:t>
+              <a:t>8/28/2017</a:t>
             </a:fld>
             <a:endParaRPr lang="en-US"/>
           </a:p>
@@ -7307,7 +7581,7 @@
             <a:fld id="{9A46249C-EA92-4608-8FCA-65260396BA27}" type="datetime1">
               <a:rPr lang="en-US" smtClean="0"/>
               <a:pPr/>
-              <a:t>8/11/2017</a:t>
+              <a:t>8/28/2017</a:t>
             </a:fld>
             <a:endParaRPr lang="en-US"/>
           </a:p>
@@ -7472,7 +7746,7 @@
             <a:fld id="{E98573EB-F81F-45A8-8502-B7F241F6310C}" type="datetime1">
               <a:rPr lang="en-US" smtClean="0"/>
               <a:pPr/>
-              <a:t>8/11/2017</a:t>
+              <a:t>8/28/2017</a:t>
             </a:fld>
             <a:endParaRPr lang="en-US"/>
           </a:p>
@@ -7647,7 +7921,7 @@
             <a:fld id="{D3B68F27-4D23-4B43-9126-090EEA2632D9}" type="datetime1">
               <a:rPr lang="en-US" smtClean="0"/>
               <a:pPr/>
-              <a:t>8/11/2017</a:t>
+              <a:t>8/28/2017</a:t>
             </a:fld>
             <a:endParaRPr lang="en-US"/>
           </a:p>
@@ -7883,7 +8157,7 @@
           <a:p>
             <a:fld id="{2F1F79F5-7BEC-496A-AFC7-876E38F64D71}" type="datetime1">
               <a:rPr lang="en-US" smtClean="0"/>
-              <a:t>8/11/2017</a:t>
+              <a:t>8/28/2017</a:t>
             </a:fld>
             <a:endParaRPr lang="en-US"/>
           </a:p>
@@ -8057,7 +8331,7 @@
           <a:p>
             <a:fld id="{E22ED4DA-448D-4BB1-B935-CC112220207B}" type="datetime1">
               <a:rPr lang="en-US" smtClean="0"/>
-              <a:t>8/11/2017</a:t>
+              <a:t>8/28/2017</a:t>
             </a:fld>
             <a:endParaRPr lang="en-US"/>
           </a:p>
@@ -8230,7 +8504,7 @@
           <a:p>
             <a:fld id="{E22ED4DA-448D-4BB1-B935-CC112220207B}" type="datetime1">
               <a:rPr lang="en-US" smtClean="0"/>
-              <a:t>8/11/2017</a:t>
+              <a:t>8/28/2017</a:t>
             </a:fld>
             <a:endParaRPr lang="en-US"/>
           </a:p>
@@ -8493,7 +8767,7 @@
           <a:p>
             <a:fld id="{FF5D65A6-AB94-4435-B0B7-3743215FA46C}" type="datetime1">
               <a:rPr lang="en-US" smtClean="0"/>
-              <a:t>8/11/2017</a:t>
+              <a:t>8/28/2017</a:t>
             </a:fld>
             <a:endParaRPr lang="en-US"/>
           </a:p>
@@ -8669,7 +8943,7 @@
           <a:p>
             <a:fld id="{FF5D65A6-AB94-4435-B0B7-3743215FA46C}" type="datetime1">
               <a:rPr lang="en-US" smtClean="0"/>
-              <a:t>8/11/2017</a:t>
+              <a:t>8/28/2017</a:t>
             </a:fld>
             <a:endParaRPr lang="en-US"/>
           </a:p>
@@ -8963,7 +9237,7 @@
           <a:p>
             <a:fld id="{7C193DC4-6EF0-48C9-B29C-616106A645E1}" type="datetime1">
               <a:rPr lang="en-US" smtClean="0"/>
-              <a:t>8/11/2017</a:t>
+              <a:t>8/28/2017</a:t>
             </a:fld>
             <a:endParaRPr lang="en-US"/>
           </a:p>
@@ -9248,7 +9522,7 @@
           <a:p>
             <a:fld id="{5D1846AD-9252-4647-9435-4C2AC365653A}" type="datetime1">
               <a:rPr lang="en-US" smtClean="0"/>
-              <a:t>8/11/2017</a:t>
+              <a:t>8/28/2017</a:t>
             </a:fld>
             <a:endParaRPr lang="en-US"/>
           </a:p>
@@ -9423,7 +9697,7 @@
             <a:fld id="{AF79D0BF-EDA9-4C0D-B5C1-D01FE3C9392D}" type="datetime1">
               <a:rPr lang="en-US" smtClean="0"/>
               <a:pPr/>
-              <a:t>8/11/2017</a:t>
+              <a:t>8/28/2017</a:t>
             </a:fld>
             <a:endParaRPr lang="en-US"/>
           </a:p>
@@ -9718,7 +9992,7 @@
           <a:p>
             <a:fld id="{5D1846AD-9252-4647-9435-4C2AC365653A}" type="datetime1">
               <a:rPr lang="en-US" smtClean="0"/>
-              <a:t>8/11/2017</a:t>
+              <a:t>8/28/2017</a:t>
             </a:fld>
             <a:endParaRPr lang="en-US"/>
           </a:p>
@@ -10137,7 +10411,7 @@
           <a:p>
             <a:fld id="{CE56DC10-3561-4063-A6AF-C1CC7A41040A}" type="datetime1">
               <a:rPr lang="en-US" smtClean="0"/>
-              <a:t>8/11/2017</a:t>
+              <a:t>8/28/2017</a:t>
             </a:fld>
             <a:endParaRPr lang="en-US"/>
           </a:p>
@@ -10254,7 +10528,7 @@
           <a:p>
             <a:fld id="{2F7B77F5-1464-4F6B-92A8-64FC8A508293}" type="datetime1">
               <a:rPr lang="en-US" smtClean="0"/>
-              <a:t>8/11/2017</a:t>
+              <a:t>8/28/2017</a:t>
             </a:fld>
             <a:endParaRPr lang="en-US"/>
           </a:p>
@@ -10349,7 +10623,7 @@
           <a:p>
             <a:fld id="{0A05703A-7669-4FEA-9056-25299B4D29D4}" type="datetime1">
               <a:rPr lang="en-US" smtClean="0"/>
-              <a:t>8/11/2017</a:t>
+              <a:t>8/28/2017</a:t>
             </a:fld>
             <a:endParaRPr lang="en-US"/>
           </a:p>
@@ -10624,7 +10898,7 @@
           <a:p>
             <a:fld id="{6E5077B5-BB57-49DB-88CA-226A139E5C01}" type="datetime1">
               <a:rPr lang="en-US" smtClean="0"/>
-              <a:t>8/11/2017</a:t>
+              <a:t>8/28/2017</a:t>
             </a:fld>
             <a:endParaRPr lang="en-US"/>
           </a:p>
@@ -10876,7 +11150,7 @@
           <a:p>
             <a:fld id="{C48D9447-CBD6-49A1-89FD-8512A8CF8999}" type="datetime1">
               <a:rPr lang="en-US" smtClean="0"/>
-              <a:t>8/11/2017</a:t>
+              <a:t>8/28/2017</a:t>
             </a:fld>
             <a:endParaRPr lang="en-US"/>
           </a:p>
@@ -11044,7 +11318,7 @@
           <a:p>
             <a:fld id="{A3639A2A-823D-48B7-9ACE-7FAF42870BA9}" type="datetime1">
               <a:rPr lang="en-US" smtClean="0"/>
-              <a:t>8/11/2017</a:t>
+              <a:t>8/28/2017</a:t>
             </a:fld>
             <a:endParaRPr lang="en-US"/>
           </a:p>
@@ -11222,7 +11496,7 @@
           <a:p>
             <a:fld id="{ED1B6996-82E9-463C-972C-7B56056E426C}" type="datetime1">
               <a:rPr lang="en-US" smtClean="0"/>
-              <a:t>8/11/2017</a:t>
+              <a:t>8/28/2017</a:t>
             </a:fld>
             <a:endParaRPr lang="en-US"/>
           </a:p>
@@ -11405,7 +11679,7 @@
             <a:fld id="{AF79D0BF-EDA9-4C0D-B5C1-D01FE3C9392D}" type="datetime1">
               <a:rPr lang="en-US" smtClean="0"/>
               <a:pPr/>
-              <a:t>8/11/2017</a:t>
+              <a:t>8/28/2017</a:t>
             </a:fld>
             <a:endParaRPr lang="en-US"/>
           </a:p>
@@ -11652,7 +11926,7 @@
             <a:fld id="{D69015D0-49B0-4059-80BB-AF092C6CC282}" type="datetime1">
               <a:rPr lang="en-US" smtClean="0"/>
               <a:pPr/>
-              <a:t>8/11/2017</a:t>
+              <a:t>8/28/2017</a:t>
             </a:fld>
             <a:endParaRPr lang="en-US"/>
           </a:p>
@@ -11934,7 +12208,7 @@
             <a:fld id="{6CFAE174-28EF-4C23-BFDE-B69E139D8EE0}" type="datetime1">
               <a:rPr lang="en-US" smtClean="0"/>
               <a:pPr/>
-              <a:t>8/11/2017</a:t>
+              <a:t>8/28/2017</a:t>
             </a:fld>
             <a:endParaRPr lang="en-US"/>
           </a:p>
@@ -12350,7 +12624,7 @@
             <a:fld id="{3C4735FC-F3F4-4930-AD2E-C703D7636E65}" type="datetime1">
               <a:rPr lang="en-US" smtClean="0"/>
               <a:pPr/>
-              <a:t>8/11/2017</a:t>
+              <a:t>8/28/2017</a:t>
             </a:fld>
             <a:endParaRPr lang="en-US"/>
           </a:p>
@@ -12464,7 +12738,7 @@
             <a:fld id="{37087D82-BB00-4296-AA4E-C167745A82DE}" type="datetime1">
               <a:rPr lang="en-US" smtClean="0"/>
               <a:pPr/>
-              <a:t>8/11/2017</a:t>
+              <a:t>8/28/2017</a:t>
             </a:fld>
             <a:endParaRPr lang="en-US"/>
           </a:p>
@@ -12556,7 +12830,7 @@
             <a:fld id="{E416393F-B669-482B-BFD6-501DDE1069A2}" type="datetime1">
               <a:rPr lang="en-US" smtClean="0"/>
               <a:pPr/>
-              <a:t>8/11/2017</a:t>
+              <a:t>8/28/2017</a:t>
             </a:fld>
             <a:endParaRPr lang="en-US"/>
           </a:p>
@@ -12828,7 +13102,7 @@
             <a:fld id="{8FFF435E-64AB-44BA-AD31-EDF4E3683DDC}" type="datetime1">
               <a:rPr lang="en-US" smtClean="0"/>
               <a:pPr/>
-              <a:t>8/11/2017</a:t>
+              <a:t>8/28/2017</a:t>
             </a:fld>
             <a:endParaRPr lang="en-US"/>
           </a:p>
@@ -13036,7 +13310,7 @@
             <a:fld id="{9FD4D3D6-E918-4CCA-AF93-9744A928CB26}" type="datetime1">
               <a:rPr lang="en-US" smtClean="0"/>
               <a:pPr/>
-              <a:t>8/11/2017</a:t>
+              <a:t>8/28/2017</a:t>
             </a:fld>
             <a:endParaRPr lang="en-US"/>
           </a:p>
@@ -13554,7 +13828,7 @@
           <a:p>
             <a:fld id="{02B3F677-983B-48DB-ADFD-63FE6CBC7FB2}" type="datetime1">
               <a:rPr lang="en-US" smtClean="0"/>
-              <a:t>8/11/2017</a:t>
+              <a:t>8/28/2017</a:t>
             </a:fld>
             <a:endParaRPr lang="en-US"/>
           </a:p>
@@ -16906,18 +17180,18 @@
           <p:nvPr>
             <p:extLst>
               <p:ext uri="{D42A27DB-BD31-4B8C-83A1-F6EECF244321}">
-                <p14:modId xmlns:p14="http://schemas.microsoft.com/office/powerpoint/2010/main" val="978899263"/>
+                <p14:modId xmlns:p14="http://schemas.microsoft.com/office/powerpoint/2010/main" val="2741905980"/>
               </p:ext>
             </p:extLst>
           </p:nvPr>
         </p:nvGraphicFramePr>
         <p:xfrm>
           <a:off x="1524000" y="1727994"/>
-          <a:ext cx="6096000" cy="4318000"/>
+          <a:ext cx="6096000" cy="4825206"/>
         </p:xfrm>
         <a:graphic>
           <a:graphicData uri="http://schemas.openxmlformats.org/drawingml/2006/diagram">
-            <dgm:relIds xmlns:dgm="http://schemas.openxmlformats.org/drawingml/2006/diagram" xmlns:r="http://schemas.openxmlformats.org/officeDocument/2006/relationships" r:dm="rId2" r:lo="rId3" r:qs="rId4" r:cs="rId5"/>
+            <dgm:relIds xmlns:dgm="http://schemas.openxmlformats.org/drawingml/2006/diagram" xmlns:r="http://schemas.openxmlformats.org/officeDocument/2006/relationships" r:dm="rId3" r:lo="rId4" r:qs="rId5" r:cs="rId6"/>
           </a:graphicData>
         </a:graphic>
       </p:graphicFrame>

</xml_diff>

<commit_message>
fixed 'Faren' in L1.1, fixed typo in L2.3
</commit_message>
<xml_diff>
--- a/Slides/Lesson 1.1 The Function Design Recipe.pptx
+++ b/Slides/Lesson 1.1 The Function Design Recipe.pptx
@@ -44,41 +44,41 @@
   <p:notesSz cx="6858000" cy="9296400"/>
   <p:embeddedFontLst>
     <p:embeddedFont>
-      <p:font typeface="CMSY10ORIG" panose="020B0604020202020204"/>
+      <p:font typeface="Calibri" panose="020F0502020204030204" pitchFamily="34" charset="0"/>
       <p:regular r:id="rId32"/>
+      <p:bold r:id="rId33"/>
+      <p:italic r:id="rId34"/>
+      <p:boldItalic r:id="rId35"/>
     </p:embeddedFont>
     <p:embeddedFont>
       <p:font typeface="cmmi12" panose="020B0604020202020204"/>
-      <p:regular r:id="rId33"/>
+      <p:regular r:id="rId36"/>
     </p:embeddedFont>
     <p:embeddedFont>
-      <p:font typeface="CMMI10" panose="020B0604020202020204"/>
-      <p:regular r:id="rId34"/>
+      <p:font typeface="CMSY10ORIG" panose="020B0604020202020204"/>
+      <p:regular r:id="rId37"/>
+    </p:embeddedFont>
+    <p:embeddedFont>
+      <p:font typeface="Arial Unicode MS" panose="020B0604020202020204" charset="-128"/>
+      <p:regular r:id="rId38"/>
     </p:embeddedFont>
     <p:embeddedFont>
       <p:font typeface="Cambria Math" panose="02040503050406030204" pitchFamily="18" charset="0"/>
-      <p:regular r:id="rId35"/>
+      <p:regular r:id="rId39"/>
     </p:embeddedFont>
     <p:embeddedFont>
       <p:font typeface="Consolas" panose="020B0609020204030204" pitchFamily="49" charset="0"/>
-      <p:regular r:id="rId36"/>
-      <p:bold r:id="rId37"/>
-      <p:italic r:id="rId38"/>
-      <p:boldItalic r:id="rId39"/>
-    </p:embeddedFont>
-    <p:embeddedFont>
-      <p:font typeface="Calibri" panose="020F0502020204030204" pitchFamily="34" charset="0"/>
       <p:regular r:id="rId40"/>
       <p:bold r:id="rId41"/>
       <p:italic r:id="rId42"/>
       <p:boldItalic r:id="rId43"/>
     </p:embeddedFont>
     <p:embeddedFont>
-      <p:font typeface="Arial Unicode MS" panose="020B0604020202020204" pitchFamily="34" charset="-128"/>
+      <p:font typeface="CMR10" panose="020B0604020202020204"/>
       <p:regular r:id="rId44"/>
     </p:embeddedFont>
     <p:embeddedFont>
-      <p:font typeface="CMR10" panose="020B0604020202020204"/>
+      <p:font typeface="CMMI10" panose="020B0604020202020204"/>
       <p:regular r:id="rId45"/>
     </p:embeddedFont>
   </p:embeddedFontLst>
@@ -4949,7 +4949,7 @@
             <a:fld id="{F428509D-A83E-4130-9123-C9B4F5E9EE37}" type="datetimeFigureOut">
               <a:rPr lang="en-US" smtClean="0"/>
               <a:pPr/>
-              <a:t>8/11/2017</a:t>
+              <a:t>9/17/2017</a:t>
             </a:fld>
             <a:endParaRPr lang="en-US"/>
           </a:p>
@@ -5116,7 +5116,7 @@
             <a:fld id="{ACC16E80-119B-43B5-8043-B652C91D44CD}" type="datetimeFigureOut">
               <a:rPr lang="en-US" smtClean="0"/>
               <a:pPr/>
-              <a:t>8/11/2017</a:t>
+              <a:t>9/17/2017</a:t>
             </a:fld>
             <a:endParaRPr lang="en-US"/>
           </a:p>
@@ -7058,7 +7058,7 @@
             <a:fld id="{995A3EAA-2ADF-4730-8F37-D322F0FCA6F7}" type="datetime1">
               <a:rPr lang="en-US" smtClean="0"/>
               <a:pPr/>
-              <a:t>8/11/2017</a:t>
+              <a:t>9/17/2017</a:t>
             </a:fld>
             <a:endParaRPr lang="en-US"/>
           </a:p>
@@ -7307,7 +7307,7 @@
             <a:fld id="{9A46249C-EA92-4608-8FCA-65260396BA27}" type="datetime1">
               <a:rPr lang="en-US" smtClean="0"/>
               <a:pPr/>
-              <a:t>8/11/2017</a:t>
+              <a:t>9/17/2017</a:t>
             </a:fld>
             <a:endParaRPr lang="en-US"/>
           </a:p>
@@ -7472,7 +7472,7 @@
             <a:fld id="{E98573EB-F81F-45A8-8502-B7F241F6310C}" type="datetime1">
               <a:rPr lang="en-US" smtClean="0"/>
               <a:pPr/>
-              <a:t>8/11/2017</a:t>
+              <a:t>9/17/2017</a:t>
             </a:fld>
             <a:endParaRPr lang="en-US"/>
           </a:p>
@@ -7647,7 +7647,7 @@
             <a:fld id="{D3B68F27-4D23-4B43-9126-090EEA2632D9}" type="datetime1">
               <a:rPr lang="en-US" smtClean="0"/>
               <a:pPr/>
-              <a:t>8/11/2017</a:t>
+              <a:t>9/17/2017</a:t>
             </a:fld>
             <a:endParaRPr lang="en-US"/>
           </a:p>
@@ -7883,7 +7883,7 @@
           <a:p>
             <a:fld id="{2F1F79F5-7BEC-496A-AFC7-876E38F64D71}" type="datetime1">
               <a:rPr lang="en-US" smtClean="0"/>
-              <a:t>8/11/2017</a:t>
+              <a:t>9/17/2017</a:t>
             </a:fld>
             <a:endParaRPr lang="en-US"/>
           </a:p>
@@ -8057,7 +8057,7 @@
           <a:p>
             <a:fld id="{E22ED4DA-448D-4BB1-B935-CC112220207B}" type="datetime1">
               <a:rPr lang="en-US" smtClean="0"/>
-              <a:t>8/11/2017</a:t>
+              <a:t>9/17/2017</a:t>
             </a:fld>
             <a:endParaRPr lang="en-US"/>
           </a:p>
@@ -8230,7 +8230,7 @@
           <a:p>
             <a:fld id="{E22ED4DA-448D-4BB1-B935-CC112220207B}" type="datetime1">
               <a:rPr lang="en-US" smtClean="0"/>
-              <a:t>8/11/2017</a:t>
+              <a:t>9/17/2017</a:t>
             </a:fld>
             <a:endParaRPr lang="en-US"/>
           </a:p>
@@ -8493,7 +8493,7 @@
           <a:p>
             <a:fld id="{FF5D65A6-AB94-4435-B0B7-3743215FA46C}" type="datetime1">
               <a:rPr lang="en-US" smtClean="0"/>
-              <a:t>8/11/2017</a:t>
+              <a:t>9/17/2017</a:t>
             </a:fld>
             <a:endParaRPr lang="en-US"/>
           </a:p>
@@ -8669,7 +8669,7 @@
           <a:p>
             <a:fld id="{FF5D65A6-AB94-4435-B0B7-3743215FA46C}" type="datetime1">
               <a:rPr lang="en-US" smtClean="0"/>
-              <a:t>8/11/2017</a:t>
+              <a:t>9/17/2017</a:t>
             </a:fld>
             <a:endParaRPr lang="en-US"/>
           </a:p>
@@ -8963,7 +8963,7 @@
           <a:p>
             <a:fld id="{7C193DC4-6EF0-48C9-B29C-616106A645E1}" type="datetime1">
               <a:rPr lang="en-US" smtClean="0"/>
-              <a:t>8/11/2017</a:t>
+              <a:t>9/17/2017</a:t>
             </a:fld>
             <a:endParaRPr lang="en-US"/>
           </a:p>
@@ -9248,7 +9248,7 @@
           <a:p>
             <a:fld id="{5D1846AD-9252-4647-9435-4C2AC365653A}" type="datetime1">
               <a:rPr lang="en-US" smtClean="0"/>
-              <a:t>8/11/2017</a:t>
+              <a:t>9/17/2017</a:t>
             </a:fld>
             <a:endParaRPr lang="en-US"/>
           </a:p>
@@ -9423,7 +9423,7 @@
             <a:fld id="{AF79D0BF-EDA9-4C0D-B5C1-D01FE3C9392D}" type="datetime1">
               <a:rPr lang="en-US" smtClean="0"/>
               <a:pPr/>
-              <a:t>8/11/2017</a:t>
+              <a:t>9/17/2017</a:t>
             </a:fld>
             <a:endParaRPr lang="en-US"/>
           </a:p>
@@ -9718,7 +9718,7 @@
           <a:p>
             <a:fld id="{5D1846AD-9252-4647-9435-4C2AC365653A}" type="datetime1">
               <a:rPr lang="en-US" smtClean="0"/>
-              <a:t>8/11/2017</a:t>
+              <a:t>9/17/2017</a:t>
             </a:fld>
             <a:endParaRPr lang="en-US"/>
           </a:p>
@@ -10137,7 +10137,7 @@
           <a:p>
             <a:fld id="{CE56DC10-3561-4063-A6AF-C1CC7A41040A}" type="datetime1">
               <a:rPr lang="en-US" smtClean="0"/>
-              <a:t>8/11/2017</a:t>
+              <a:t>9/17/2017</a:t>
             </a:fld>
             <a:endParaRPr lang="en-US"/>
           </a:p>
@@ -10254,7 +10254,7 @@
           <a:p>
             <a:fld id="{2F7B77F5-1464-4F6B-92A8-64FC8A508293}" type="datetime1">
               <a:rPr lang="en-US" smtClean="0"/>
-              <a:t>8/11/2017</a:t>
+              <a:t>9/17/2017</a:t>
             </a:fld>
             <a:endParaRPr lang="en-US"/>
           </a:p>
@@ -10349,7 +10349,7 @@
           <a:p>
             <a:fld id="{0A05703A-7669-4FEA-9056-25299B4D29D4}" type="datetime1">
               <a:rPr lang="en-US" smtClean="0"/>
-              <a:t>8/11/2017</a:t>
+              <a:t>9/17/2017</a:t>
             </a:fld>
             <a:endParaRPr lang="en-US"/>
           </a:p>
@@ -10624,7 +10624,7 @@
           <a:p>
             <a:fld id="{6E5077B5-BB57-49DB-88CA-226A139E5C01}" type="datetime1">
               <a:rPr lang="en-US" smtClean="0"/>
-              <a:t>8/11/2017</a:t>
+              <a:t>9/17/2017</a:t>
             </a:fld>
             <a:endParaRPr lang="en-US"/>
           </a:p>
@@ -10876,7 +10876,7 @@
           <a:p>
             <a:fld id="{C48D9447-CBD6-49A1-89FD-8512A8CF8999}" type="datetime1">
               <a:rPr lang="en-US" smtClean="0"/>
-              <a:t>8/11/2017</a:t>
+              <a:t>9/17/2017</a:t>
             </a:fld>
             <a:endParaRPr lang="en-US"/>
           </a:p>
@@ -11044,7 +11044,7 @@
           <a:p>
             <a:fld id="{A3639A2A-823D-48B7-9ACE-7FAF42870BA9}" type="datetime1">
               <a:rPr lang="en-US" smtClean="0"/>
-              <a:t>8/11/2017</a:t>
+              <a:t>9/17/2017</a:t>
             </a:fld>
             <a:endParaRPr lang="en-US"/>
           </a:p>
@@ -11222,7 +11222,7 @@
           <a:p>
             <a:fld id="{ED1B6996-82E9-463C-972C-7B56056E426C}" type="datetime1">
               <a:rPr lang="en-US" smtClean="0"/>
-              <a:t>8/11/2017</a:t>
+              <a:t>9/17/2017</a:t>
             </a:fld>
             <a:endParaRPr lang="en-US"/>
           </a:p>
@@ -11405,7 +11405,7 @@
             <a:fld id="{AF79D0BF-EDA9-4C0D-B5C1-D01FE3C9392D}" type="datetime1">
               <a:rPr lang="en-US" smtClean="0"/>
               <a:pPr/>
-              <a:t>8/11/2017</a:t>
+              <a:t>9/17/2017</a:t>
             </a:fld>
             <a:endParaRPr lang="en-US"/>
           </a:p>
@@ -11652,7 +11652,7 @@
             <a:fld id="{D69015D0-49B0-4059-80BB-AF092C6CC282}" type="datetime1">
               <a:rPr lang="en-US" smtClean="0"/>
               <a:pPr/>
-              <a:t>8/11/2017</a:t>
+              <a:t>9/17/2017</a:t>
             </a:fld>
             <a:endParaRPr lang="en-US"/>
           </a:p>
@@ -11934,7 +11934,7 @@
             <a:fld id="{6CFAE174-28EF-4C23-BFDE-B69E139D8EE0}" type="datetime1">
               <a:rPr lang="en-US" smtClean="0"/>
               <a:pPr/>
-              <a:t>8/11/2017</a:t>
+              <a:t>9/17/2017</a:t>
             </a:fld>
             <a:endParaRPr lang="en-US"/>
           </a:p>
@@ -12350,7 +12350,7 @@
             <a:fld id="{3C4735FC-F3F4-4930-AD2E-C703D7636E65}" type="datetime1">
               <a:rPr lang="en-US" smtClean="0"/>
               <a:pPr/>
-              <a:t>8/11/2017</a:t>
+              <a:t>9/17/2017</a:t>
             </a:fld>
             <a:endParaRPr lang="en-US"/>
           </a:p>
@@ -12464,7 +12464,7 @@
             <a:fld id="{37087D82-BB00-4296-AA4E-C167745A82DE}" type="datetime1">
               <a:rPr lang="en-US" smtClean="0"/>
               <a:pPr/>
-              <a:t>8/11/2017</a:t>
+              <a:t>9/17/2017</a:t>
             </a:fld>
             <a:endParaRPr lang="en-US"/>
           </a:p>
@@ -12556,7 +12556,7 @@
             <a:fld id="{E416393F-B669-482B-BFD6-501DDE1069A2}" type="datetime1">
               <a:rPr lang="en-US" smtClean="0"/>
               <a:pPr/>
-              <a:t>8/11/2017</a:t>
+              <a:t>9/17/2017</a:t>
             </a:fld>
             <a:endParaRPr lang="en-US"/>
           </a:p>
@@ -12828,7 +12828,7 @@
             <a:fld id="{8FFF435E-64AB-44BA-AD31-EDF4E3683DDC}" type="datetime1">
               <a:rPr lang="en-US" smtClean="0"/>
               <a:pPr/>
-              <a:t>8/11/2017</a:t>
+              <a:t>9/17/2017</a:t>
             </a:fld>
             <a:endParaRPr lang="en-US"/>
           </a:p>
@@ -13036,7 +13036,7 @@
             <a:fld id="{9FD4D3D6-E918-4CCA-AF93-9744A928CB26}" type="datetime1">
               <a:rPr lang="en-US" smtClean="0"/>
               <a:pPr/>
-              <a:t>8/11/2017</a:t>
+              <a:t>9/17/2017</a:t>
             </a:fld>
             <a:endParaRPr lang="en-US"/>
           </a:p>
@@ -13554,7 +13554,7 @@
           <a:p>
             <a:fld id="{02B3F677-983B-48DB-ADFD-63FE6CBC7FB2}" type="datetime1">
               <a:rPr lang="en-US" smtClean="0"/>
-              <a:t>8/11/2017</a:t>
+              <a:t>9/17/2017</a:t>
             </a:fld>
             <a:endParaRPr lang="en-US"/>
           </a:p>
@@ -16170,7 +16170,7 @@
             </a:r>
             <a:r>
               <a:rPr lang="en-US" sz="2400" dirty="0" err="1"/>
-              <a:t>FarenTemp</a:t>
+              <a:t>FahrenTemp</a:t>
             </a:r>
             <a:r>
               <a:rPr lang="en-US" sz="2400" dirty="0"/>
@@ -16207,7 +16207,7 @@
             </a:r>
             <a:r>
               <a:rPr lang="en-US" sz="2400" dirty="0" err="1"/>
-              <a:t>FarenTemp</a:t>
+              <a:t>FahrenTemp</a:t>
             </a:r>
             <a:r>
               <a:rPr lang="en-US" sz="2400" dirty="0"/>
@@ -16233,12 +16233,8 @@
           </a:p>
           <a:p>
             <a:r>
-              <a:rPr lang="en-US" sz="2400"/>
-              <a:t>;;   surface </a:t>
-            </a:r>
-            <a:r>
               <a:rPr lang="en-US" sz="2400" dirty="0"/>
-              <a:t>of Mars, in Celsius</a:t>
+              <a:t>;;   surface of Mars, in Celsius</a:t>
             </a:r>
           </a:p>
         </p:txBody>
@@ -19473,7 +19469,7 @@
             </a:r>
             <a:r>
               <a:rPr lang="en-US" dirty="0" err="1"/>
-              <a:t>FarenTemp</a:t>
+              <a:t>FahrenTemp</a:t>
             </a:r>
             <a:r>
               <a:rPr lang="en-US" dirty="0"/>
@@ -19504,7 +19500,7 @@
             </a:r>
             <a:r>
               <a:rPr lang="en-US" dirty="0" err="1"/>
-              <a:t>FarenTemp</a:t>
+              <a:t>FahrenTemp</a:t>
             </a:r>
             <a:r>
               <a:rPr lang="en-US" dirty="0"/>

</xml_diff>